<commit_message>
Mise a jour de la présentation
</commit_message>
<xml_diff>
--- a/doc/King Skull Classic Online.pptx
+++ b/doc/King Skull Classic Online.pptx
@@ -4,6 +4,9 @@
   <p:sldMasterIdLst>
     <p:sldMasterId id="2147483726" r:id="rId1"/>
   </p:sldMasterIdLst>
+  <p:notesMasterIdLst>
+    <p:notesMasterId r:id="rId14"/>
+  </p:notesMasterIdLst>
   <p:sldIdLst>
     <p:sldId id="256" r:id="rId2"/>
     <p:sldId id="263" r:id="rId3"/>
@@ -14,7 +17,9 @@
     <p:sldId id="261" r:id="rId8"/>
     <p:sldId id="265" r:id="rId9"/>
     <p:sldId id="264" r:id="rId10"/>
-    <p:sldId id="262" r:id="rId11"/>
+    <p:sldId id="266" r:id="rId11"/>
+    <p:sldId id="267" r:id="rId12"/>
+    <p:sldId id="262" r:id="rId13"/>
   </p:sldIdLst>
   <p:sldSz cx="12192000" cy="6858000"/>
   <p:notesSz cx="6858000" cy="9144000"/>
@@ -587,6 +592,799 @@
 </pc:chgInfo>
 </file>
 
+<file path=ppt/notesMasters/notesMaster1.xml><?xml version="1.0" encoding="utf-8"?>
+<p:notesMaster xmlns:a="http://schemas.openxmlformats.org/drawingml/2006/main" xmlns:r="http://schemas.openxmlformats.org/officeDocument/2006/relationships" xmlns:p="http://schemas.openxmlformats.org/presentationml/2006/main">
+  <p:cSld>
+    <p:bg>
+      <p:bgRef idx="1001">
+        <a:schemeClr val="bg1"/>
+      </p:bgRef>
+    </p:bg>
+    <p:spTree>
+      <p:nvGrpSpPr>
+        <p:cNvPr id="1" name=""/>
+        <p:cNvGrpSpPr/>
+        <p:nvPr/>
+      </p:nvGrpSpPr>
+      <p:grpSpPr>
+        <a:xfrm>
+          <a:off x="0" y="0"/>
+          <a:ext cx="0" cy="0"/>
+          <a:chOff x="0" y="0"/>
+          <a:chExt cx="0" cy="0"/>
+        </a:xfrm>
+      </p:grpSpPr>
+      <p:sp>
+        <p:nvSpPr>
+          <p:cNvPr id="2" name="Espace réservé de l'en-tête 1"/>
+          <p:cNvSpPr>
+            <a:spLocks noGrp="1"/>
+          </p:cNvSpPr>
+          <p:nvPr>
+            <p:ph type="hdr" sz="quarter"/>
+          </p:nvPr>
+        </p:nvSpPr>
+        <p:spPr>
+          <a:xfrm>
+            <a:off x="0" y="0"/>
+            <a:ext cx="2971800" cy="458788"/>
+          </a:xfrm>
+          <a:prstGeom prst="rect">
+            <a:avLst/>
+          </a:prstGeom>
+        </p:spPr>
+        <p:txBody>
+          <a:bodyPr vert="horz" lIns="91440" tIns="45720" rIns="91440" bIns="45720" rtlCol="0"/>
+          <a:lstStyle>
+            <a:lvl1pPr algn="l">
+              <a:defRPr sz="1200"/>
+            </a:lvl1pPr>
+          </a:lstStyle>
+          <a:p>
+            <a:endParaRPr lang="fr-CH"/>
+          </a:p>
+        </p:txBody>
+      </p:sp>
+      <p:sp>
+        <p:nvSpPr>
+          <p:cNvPr id="3" name="Espace réservé de la date 2"/>
+          <p:cNvSpPr>
+            <a:spLocks noGrp="1"/>
+          </p:cNvSpPr>
+          <p:nvPr>
+            <p:ph type="dt" idx="1"/>
+          </p:nvPr>
+        </p:nvSpPr>
+        <p:spPr>
+          <a:xfrm>
+            <a:off x="3884613" y="0"/>
+            <a:ext cx="2971800" cy="458788"/>
+          </a:xfrm>
+          <a:prstGeom prst="rect">
+            <a:avLst/>
+          </a:prstGeom>
+        </p:spPr>
+        <p:txBody>
+          <a:bodyPr vert="horz" lIns="91440" tIns="45720" rIns="91440" bIns="45720" rtlCol="0"/>
+          <a:lstStyle>
+            <a:lvl1pPr algn="r">
+              <a:defRPr sz="1200"/>
+            </a:lvl1pPr>
+          </a:lstStyle>
+          <a:p>
+            <a:fld id="{85640DD4-D970-44BD-8902-DE09080CFD08}" type="datetimeFigureOut">
+              <a:rPr lang="fr-CH" smtClean="0"/>
+              <a:t>06.09.2022</a:t>
+            </a:fld>
+            <a:endParaRPr lang="fr-CH"/>
+          </a:p>
+        </p:txBody>
+      </p:sp>
+      <p:sp>
+        <p:nvSpPr>
+          <p:cNvPr id="4" name="Espace réservé de l'image des diapositives 3"/>
+          <p:cNvSpPr>
+            <a:spLocks noGrp="1" noRot="1" noChangeAspect="1"/>
+          </p:cNvSpPr>
+          <p:nvPr>
+            <p:ph type="sldImg" idx="2"/>
+          </p:nvPr>
+        </p:nvSpPr>
+        <p:spPr>
+          <a:xfrm>
+            <a:off x="685800" y="1143000"/>
+            <a:ext cx="5486400" cy="3086100"/>
+          </a:xfrm>
+          <a:prstGeom prst="rect">
+            <a:avLst/>
+          </a:prstGeom>
+          <a:noFill/>
+          <a:ln w="12700">
+            <a:solidFill>
+              <a:prstClr val="black"/>
+            </a:solidFill>
+          </a:ln>
+        </p:spPr>
+        <p:txBody>
+          <a:bodyPr vert="horz" lIns="91440" tIns="45720" rIns="91440" bIns="45720" rtlCol="0" anchor="ctr"/>
+          <a:lstStyle/>
+          <a:p>
+            <a:endParaRPr lang="fr-CH"/>
+          </a:p>
+        </p:txBody>
+      </p:sp>
+      <p:sp>
+        <p:nvSpPr>
+          <p:cNvPr id="5" name="Espace réservé des notes 4"/>
+          <p:cNvSpPr>
+            <a:spLocks noGrp="1"/>
+          </p:cNvSpPr>
+          <p:nvPr>
+            <p:ph type="body" sz="quarter" idx="3"/>
+          </p:nvPr>
+        </p:nvSpPr>
+        <p:spPr>
+          <a:xfrm>
+            <a:off x="685800" y="4400550"/>
+            <a:ext cx="5486400" cy="3600450"/>
+          </a:xfrm>
+          <a:prstGeom prst="rect">
+            <a:avLst/>
+          </a:prstGeom>
+        </p:spPr>
+        <p:txBody>
+          <a:bodyPr vert="horz" lIns="91440" tIns="45720" rIns="91440" bIns="45720" rtlCol="0"/>
+          <a:lstStyle/>
+          <a:p>
+            <a:pPr lvl="0"/>
+            <a:r>
+              <a:rPr lang="fr-FR"/>
+              <a:t>Cliquez pour modifier les styles du texte du masque</a:t>
+            </a:r>
+          </a:p>
+          <a:p>
+            <a:pPr lvl="1"/>
+            <a:r>
+              <a:rPr lang="fr-FR"/>
+              <a:t>Deuxième niveau</a:t>
+            </a:r>
+          </a:p>
+          <a:p>
+            <a:pPr lvl="2"/>
+            <a:r>
+              <a:rPr lang="fr-FR"/>
+              <a:t>Troisième niveau</a:t>
+            </a:r>
+          </a:p>
+          <a:p>
+            <a:pPr lvl="3"/>
+            <a:r>
+              <a:rPr lang="fr-FR"/>
+              <a:t>Quatrième niveau</a:t>
+            </a:r>
+          </a:p>
+          <a:p>
+            <a:pPr lvl="4"/>
+            <a:r>
+              <a:rPr lang="fr-FR"/>
+              <a:t>Cinquième niveau</a:t>
+            </a:r>
+            <a:endParaRPr lang="fr-CH"/>
+          </a:p>
+        </p:txBody>
+      </p:sp>
+      <p:sp>
+        <p:nvSpPr>
+          <p:cNvPr id="6" name="Espace réservé du pied de page 5"/>
+          <p:cNvSpPr>
+            <a:spLocks noGrp="1"/>
+          </p:cNvSpPr>
+          <p:nvPr>
+            <p:ph type="ftr" sz="quarter" idx="4"/>
+          </p:nvPr>
+        </p:nvSpPr>
+        <p:spPr>
+          <a:xfrm>
+            <a:off x="0" y="8685213"/>
+            <a:ext cx="2971800" cy="458787"/>
+          </a:xfrm>
+          <a:prstGeom prst="rect">
+            <a:avLst/>
+          </a:prstGeom>
+        </p:spPr>
+        <p:txBody>
+          <a:bodyPr vert="horz" lIns="91440" tIns="45720" rIns="91440" bIns="45720" rtlCol="0" anchor="b"/>
+          <a:lstStyle>
+            <a:lvl1pPr algn="l">
+              <a:defRPr sz="1200"/>
+            </a:lvl1pPr>
+          </a:lstStyle>
+          <a:p>
+            <a:endParaRPr lang="fr-CH"/>
+          </a:p>
+        </p:txBody>
+      </p:sp>
+      <p:sp>
+        <p:nvSpPr>
+          <p:cNvPr id="7" name="Espace réservé du numéro de diapositive 6"/>
+          <p:cNvSpPr>
+            <a:spLocks noGrp="1"/>
+          </p:cNvSpPr>
+          <p:nvPr>
+            <p:ph type="sldNum" sz="quarter" idx="5"/>
+          </p:nvPr>
+        </p:nvSpPr>
+        <p:spPr>
+          <a:xfrm>
+            <a:off x="3884613" y="8685213"/>
+            <a:ext cx="2971800" cy="458787"/>
+          </a:xfrm>
+          <a:prstGeom prst="rect">
+            <a:avLst/>
+          </a:prstGeom>
+        </p:spPr>
+        <p:txBody>
+          <a:bodyPr vert="horz" lIns="91440" tIns="45720" rIns="91440" bIns="45720" rtlCol="0" anchor="b"/>
+          <a:lstStyle>
+            <a:lvl1pPr algn="r">
+              <a:defRPr sz="1200"/>
+            </a:lvl1pPr>
+          </a:lstStyle>
+          <a:p>
+            <a:fld id="{5E0A905D-A60E-43A0-853E-C1E62C61160C}" type="slidenum">
+              <a:rPr lang="fr-CH" smtClean="0"/>
+              <a:t>‹N°›</a:t>
+            </a:fld>
+            <a:endParaRPr lang="fr-CH"/>
+          </a:p>
+        </p:txBody>
+      </p:sp>
+    </p:spTree>
+    <p:extLst>
+      <p:ext uri="{BB962C8B-B14F-4D97-AF65-F5344CB8AC3E}">
+        <p14:creationId xmlns:p14="http://schemas.microsoft.com/office/powerpoint/2010/main" val="3852081095"/>
+      </p:ext>
+    </p:extLst>
+  </p:cSld>
+  <p:clrMap bg1="lt1" tx1="dk1" bg2="lt2" tx2="dk2" accent1="accent1" accent2="accent2" accent3="accent3" accent4="accent4" accent5="accent5" accent6="accent6" hlink="hlink" folHlink="folHlink"/>
+  <p:notesStyle>
+    <a:lvl1pPr marL="0" algn="l" defTabSz="914400" rtl="0" eaLnBrk="1" latinLnBrk="0" hangingPunct="1">
+      <a:defRPr sz="1200" kern="1200">
+        <a:solidFill>
+          <a:schemeClr val="tx1"/>
+        </a:solidFill>
+        <a:latin typeface="+mn-lt"/>
+        <a:ea typeface="+mn-ea"/>
+        <a:cs typeface="+mn-cs"/>
+      </a:defRPr>
+    </a:lvl1pPr>
+    <a:lvl2pPr marL="457200" algn="l" defTabSz="914400" rtl="0" eaLnBrk="1" latinLnBrk="0" hangingPunct="1">
+      <a:defRPr sz="1200" kern="1200">
+        <a:solidFill>
+          <a:schemeClr val="tx1"/>
+        </a:solidFill>
+        <a:latin typeface="+mn-lt"/>
+        <a:ea typeface="+mn-ea"/>
+        <a:cs typeface="+mn-cs"/>
+      </a:defRPr>
+    </a:lvl2pPr>
+    <a:lvl3pPr marL="914400" algn="l" defTabSz="914400" rtl="0" eaLnBrk="1" latinLnBrk="0" hangingPunct="1">
+      <a:defRPr sz="1200" kern="1200">
+        <a:solidFill>
+          <a:schemeClr val="tx1"/>
+        </a:solidFill>
+        <a:latin typeface="+mn-lt"/>
+        <a:ea typeface="+mn-ea"/>
+        <a:cs typeface="+mn-cs"/>
+      </a:defRPr>
+    </a:lvl3pPr>
+    <a:lvl4pPr marL="1371600" algn="l" defTabSz="914400" rtl="0" eaLnBrk="1" latinLnBrk="0" hangingPunct="1">
+      <a:defRPr sz="1200" kern="1200">
+        <a:solidFill>
+          <a:schemeClr val="tx1"/>
+        </a:solidFill>
+        <a:latin typeface="+mn-lt"/>
+        <a:ea typeface="+mn-ea"/>
+        <a:cs typeface="+mn-cs"/>
+      </a:defRPr>
+    </a:lvl4pPr>
+    <a:lvl5pPr marL="1828800" algn="l" defTabSz="914400" rtl="0" eaLnBrk="1" latinLnBrk="0" hangingPunct="1">
+      <a:defRPr sz="1200" kern="1200">
+        <a:solidFill>
+          <a:schemeClr val="tx1"/>
+        </a:solidFill>
+        <a:latin typeface="+mn-lt"/>
+        <a:ea typeface="+mn-ea"/>
+        <a:cs typeface="+mn-cs"/>
+      </a:defRPr>
+    </a:lvl5pPr>
+    <a:lvl6pPr marL="2286000" algn="l" defTabSz="914400" rtl="0" eaLnBrk="1" latinLnBrk="0" hangingPunct="1">
+      <a:defRPr sz="1200" kern="1200">
+        <a:solidFill>
+          <a:schemeClr val="tx1"/>
+        </a:solidFill>
+        <a:latin typeface="+mn-lt"/>
+        <a:ea typeface="+mn-ea"/>
+        <a:cs typeface="+mn-cs"/>
+      </a:defRPr>
+    </a:lvl6pPr>
+    <a:lvl7pPr marL="2743200" algn="l" defTabSz="914400" rtl="0" eaLnBrk="1" latinLnBrk="0" hangingPunct="1">
+      <a:defRPr sz="1200" kern="1200">
+        <a:solidFill>
+          <a:schemeClr val="tx1"/>
+        </a:solidFill>
+        <a:latin typeface="+mn-lt"/>
+        <a:ea typeface="+mn-ea"/>
+        <a:cs typeface="+mn-cs"/>
+      </a:defRPr>
+    </a:lvl7pPr>
+    <a:lvl8pPr marL="3200400" algn="l" defTabSz="914400" rtl="0" eaLnBrk="1" latinLnBrk="0" hangingPunct="1">
+      <a:defRPr sz="1200" kern="1200">
+        <a:solidFill>
+          <a:schemeClr val="tx1"/>
+        </a:solidFill>
+        <a:latin typeface="+mn-lt"/>
+        <a:ea typeface="+mn-ea"/>
+        <a:cs typeface="+mn-cs"/>
+      </a:defRPr>
+    </a:lvl8pPr>
+    <a:lvl9pPr marL="3657600" algn="l" defTabSz="914400" rtl="0" eaLnBrk="1" latinLnBrk="0" hangingPunct="1">
+      <a:defRPr sz="1200" kern="1200">
+        <a:solidFill>
+          <a:schemeClr val="tx1"/>
+        </a:solidFill>
+        <a:latin typeface="+mn-lt"/>
+        <a:ea typeface="+mn-ea"/>
+        <a:cs typeface="+mn-cs"/>
+      </a:defRPr>
+    </a:lvl9pPr>
+  </p:notesStyle>
+</p:notesMaster>
+</file>
+
+<file path=ppt/notesSlides/notesSlide1.xml><?xml version="1.0" encoding="utf-8"?>
+<p:notes xmlns:a="http://schemas.openxmlformats.org/drawingml/2006/main" xmlns:r="http://schemas.openxmlformats.org/officeDocument/2006/relationships" xmlns:p="http://schemas.openxmlformats.org/presentationml/2006/main">
+  <p:cSld>
+    <p:spTree>
+      <p:nvGrpSpPr>
+        <p:cNvPr id="1" name=""/>
+        <p:cNvGrpSpPr/>
+        <p:nvPr/>
+      </p:nvGrpSpPr>
+      <p:grpSpPr>
+        <a:xfrm>
+          <a:off x="0" y="0"/>
+          <a:ext cx="0" cy="0"/>
+          <a:chOff x="0" y="0"/>
+          <a:chExt cx="0" cy="0"/>
+        </a:xfrm>
+      </p:grpSpPr>
+      <p:sp>
+        <p:nvSpPr>
+          <p:cNvPr id="2" name="Espace réservé de l'image des diapositives 1"/>
+          <p:cNvSpPr>
+            <a:spLocks noGrp="1" noRot="1" noChangeAspect="1"/>
+          </p:cNvSpPr>
+          <p:nvPr>
+            <p:ph type="sldImg"/>
+          </p:nvPr>
+        </p:nvSpPr>
+        <p:spPr/>
+      </p:sp>
+      <p:sp>
+        <p:nvSpPr>
+          <p:cNvPr id="3" name="Espace réservé des notes 2"/>
+          <p:cNvSpPr>
+            <a:spLocks noGrp="1"/>
+          </p:cNvSpPr>
+          <p:nvPr>
+            <p:ph type="body" idx="1"/>
+          </p:nvPr>
+        </p:nvSpPr>
+        <p:spPr/>
+        <p:txBody>
+          <a:bodyPr/>
+          <a:lstStyle/>
+          <a:p>
+            <a:r>
+              <a:rPr lang="fr-CH" dirty="0"/>
+              <a:t>Nous avions des bases en </a:t>
+            </a:r>
+            <a:r>
+              <a:rPr lang="fr-CH" dirty="0" err="1"/>
+              <a:t>c#</a:t>
+            </a:r>
+            <a:r>
+              <a:rPr lang="fr-CH" dirty="0"/>
+              <a:t> et voulions les </a:t>
+            </a:r>
+            <a:r>
+              <a:rPr lang="fr-CH" dirty="0" err="1"/>
+              <a:t>approfondire</a:t>
+            </a:r>
+            <a:r>
+              <a:rPr lang="fr-CH" dirty="0"/>
+              <a:t> afin de nous familiariser avec un nouveau langage. L’utilisation </a:t>
+            </a:r>
+            <a:r>
+              <a:rPr lang="fr-CH" dirty="0" err="1"/>
+              <a:t>d’asp</a:t>
+            </a:r>
+            <a:r>
+              <a:rPr lang="fr-CH" dirty="0"/>
+              <a:t> est logique étant donné que c’est le </a:t>
+            </a:r>
+            <a:r>
+              <a:rPr lang="fr-CH" dirty="0" err="1"/>
+              <a:t>framework</a:t>
+            </a:r>
+            <a:r>
+              <a:rPr lang="fr-CH" dirty="0"/>
+              <a:t> utilisé pour </a:t>
+            </a:r>
+            <a:r>
+              <a:rPr lang="fr-CH" dirty="0" err="1"/>
+              <a:t>microsoft</a:t>
+            </a:r>
+            <a:r>
+              <a:rPr lang="fr-CH" dirty="0"/>
+              <a:t> afin de générer des pages </a:t>
+            </a:r>
+            <a:r>
+              <a:rPr lang="fr-CH" dirty="0" err="1"/>
+              <a:t>webs</a:t>
+            </a:r>
+            <a:r>
+              <a:rPr lang="fr-CH" dirty="0"/>
+              <a:t> à la demande</a:t>
+            </a:r>
+          </a:p>
+          <a:p>
+            <a:endParaRPr lang="fr-CH" dirty="0"/>
+          </a:p>
+          <a:p>
+            <a:r>
+              <a:rPr lang="fr-CH" dirty="0"/>
+              <a:t>Nous ne voulions ni faire de javascript / java et que en </a:t>
+            </a:r>
+            <a:r>
+              <a:rPr lang="fr-CH" dirty="0" err="1"/>
+              <a:t>c#</a:t>
+            </a:r>
+            <a:r>
+              <a:rPr lang="fr-CH" dirty="0"/>
+              <a:t> / </a:t>
+            </a:r>
+            <a:r>
+              <a:rPr lang="fr-CH" dirty="0" err="1"/>
+              <a:t>asp</a:t>
+            </a:r>
+            <a:r>
+              <a:rPr lang="fr-CH" dirty="0"/>
+              <a:t> ce sont des moyens de faire connus et largement documentés. Nous nous sommes donc décidés à utiliser ceci.</a:t>
+            </a:r>
+          </a:p>
+          <a:p>
+            <a:endParaRPr lang="fr-CH" dirty="0"/>
+          </a:p>
+          <a:p>
+            <a:r>
+              <a:rPr lang="fr-CH" dirty="0"/>
+              <a:t>On a juger non prioritaire d’</a:t>
+            </a:r>
+            <a:r>
+              <a:rPr lang="fr-CH" dirty="0" err="1"/>
+              <a:t>accélerer</a:t>
+            </a:r>
+            <a:r>
+              <a:rPr lang="fr-CH" dirty="0"/>
+              <a:t> et trop chronophage le </a:t>
+            </a:r>
+            <a:r>
+              <a:rPr lang="fr-CH" dirty="0" err="1"/>
+              <a:t>deployment</a:t>
+            </a:r>
+            <a:r>
+              <a:rPr lang="fr-CH" dirty="0"/>
+              <a:t> de l’application.  Etant donné qu’une des solutions était difficile à faire et l’autre ne rapportait pas de gain de temps notable</a:t>
+            </a:r>
+          </a:p>
+        </p:txBody>
+      </p:sp>
+      <p:sp>
+        <p:nvSpPr>
+          <p:cNvPr id="4" name="Espace réservé du numéro de diapositive 3"/>
+          <p:cNvSpPr>
+            <a:spLocks noGrp="1"/>
+          </p:cNvSpPr>
+          <p:nvPr>
+            <p:ph type="sldNum" sz="quarter" idx="5"/>
+          </p:nvPr>
+        </p:nvSpPr>
+        <p:spPr/>
+        <p:txBody>
+          <a:bodyPr/>
+          <a:lstStyle/>
+          <a:p>
+            <a:fld id="{5E0A905D-A60E-43A0-853E-C1E62C61160C}" type="slidenum">
+              <a:rPr lang="fr-CH" smtClean="0"/>
+              <a:t>9</a:t>
+            </a:fld>
+            <a:endParaRPr lang="fr-CH"/>
+          </a:p>
+        </p:txBody>
+      </p:sp>
+    </p:spTree>
+    <p:extLst>
+      <p:ext uri="{BB962C8B-B14F-4D97-AF65-F5344CB8AC3E}">
+        <p14:creationId xmlns:p14="http://schemas.microsoft.com/office/powerpoint/2010/main" val="2976642993"/>
+      </p:ext>
+    </p:extLst>
+  </p:cSld>
+  <p:clrMapOvr>
+    <a:masterClrMapping/>
+  </p:clrMapOvr>
+</p:notes>
+</file>
+
+<file path=ppt/notesSlides/notesSlide2.xml><?xml version="1.0" encoding="utf-8"?>
+<p:notes xmlns:a="http://schemas.openxmlformats.org/drawingml/2006/main" xmlns:r="http://schemas.openxmlformats.org/officeDocument/2006/relationships" xmlns:p="http://schemas.openxmlformats.org/presentationml/2006/main">
+  <p:cSld>
+    <p:spTree>
+      <p:nvGrpSpPr>
+        <p:cNvPr id="1" name=""/>
+        <p:cNvGrpSpPr/>
+        <p:nvPr/>
+      </p:nvGrpSpPr>
+      <p:grpSpPr>
+        <a:xfrm>
+          <a:off x="0" y="0"/>
+          <a:ext cx="0" cy="0"/>
+          <a:chOff x="0" y="0"/>
+          <a:chExt cx="0" cy="0"/>
+        </a:xfrm>
+      </p:grpSpPr>
+      <p:sp>
+        <p:nvSpPr>
+          <p:cNvPr id="2" name="Espace réservé de l'image des diapositives 1"/>
+          <p:cNvSpPr>
+            <a:spLocks noGrp="1" noRot="1" noChangeAspect="1"/>
+          </p:cNvSpPr>
+          <p:nvPr>
+            <p:ph type="sldImg"/>
+          </p:nvPr>
+        </p:nvSpPr>
+        <p:spPr/>
+      </p:sp>
+      <p:sp>
+        <p:nvSpPr>
+          <p:cNvPr id="3" name="Espace réservé des notes 2"/>
+          <p:cNvSpPr>
+            <a:spLocks noGrp="1"/>
+          </p:cNvSpPr>
+          <p:nvPr>
+            <p:ph type="body" idx="1"/>
+          </p:nvPr>
+        </p:nvSpPr>
+        <p:spPr/>
+        <p:txBody>
+          <a:bodyPr/>
+          <a:lstStyle/>
+          <a:p>
+            <a:r>
+              <a:rPr lang="fr-CH" dirty="0"/>
+              <a:t>Pour utiliser </a:t>
+            </a:r>
+            <a:r>
+              <a:rPr lang="fr-CH" dirty="0" err="1"/>
+              <a:t>signalR</a:t>
+            </a:r>
+            <a:r>
+              <a:rPr lang="fr-CH" dirty="0"/>
+              <a:t> et </a:t>
+            </a:r>
+            <a:r>
+              <a:rPr lang="fr-CH" dirty="0" err="1"/>
+              <a:t>blazor</a:t>
+            </a:r>
+            <a:r>
+              <a:rPr lang="fr-CH" dirty="0"/>
+              <a:t>, il est nécessaire que tout le site ne soit que sur une seule page, ce que nous avions pas compris de base. Une fois que nous avons changer pour ça le projet a avancer beaucoup plus vite</a:t>
+            </a:r>
+          </a:p>
+          <a:p>
+            <a:endParaRPr lang="fr-CH" dirty="0"/>
+          </a:p>
+          <a:p>
+            <a:r>
+              <a:rPr lang="fr-CH" dirty="0"/>
+              <a:t>Au commencement, le but de l’application était qu’elle marche sans interface web. Le code ayant été produit par la suite c’est donc retrouvé pas du tout adapté pour faire des interactions clients serveurs. Il a donc fallu revoir tout le code, afin de le rendre plus adapté à nos besoins. La refonte a certes prit du temps, mais une fois terminée l’avancement du projet à été beaucoup plus rapide et surtout beaucoup plus compréhensible par un tiers.</a:t>
+            </a:r>
+          </a:p>
+          <a:p>
+            <a:endParaRPr lang="fr-CH" dirty="0"/>
+          </a:p>
+          <a:p>
+            <a:r>
+              <a:rPr lang="fr-CH" dirty="0"/>
+              <a:t>Le projet crée à la base était basé sur un projet de test disponible en ligne. Nous voulions prendre ledit projet et le modifier pour qu’il gère notre jeu de cartes. Cela c’est avéré une perte de temps importante étant donné qu’il était impossible de le faire correspondre à ce qu’on voulait. Nous avons donc recréer un projet depuis le début et séparer le tout en client / server / </a:t>
+            </a:r>
+            <a:r>
+              <a:rPr lang="fr-CH" dirty="0" err="1"/>
+              <a:t>shared</a:t>
+            </a:r>
+            <a:r>
+              <a:rPr lang="fr-CH" dirty="0"/>
+              <a:t>.</a:t>
+            </a:r>
+          </a:p>
+          <a:p>
+            <a:endParaRPr lang="fr-CH" dirty="0"/>
+          </a:p>
+          <a:p>
+            <a:r>
+              <a:rPr lang="fr-CH" dirty="0"/>
+              <a:t>On voulait </a:t>
+            </a:r>
+            <a:r>
+              <a:rPr lang="fr-CH" dirty="0" err="1"/>
+              <a:t>deploy</a:t>
+            </a:r>
+            <a:r>
+              <a:rPr lang="fr-CH" dirty="0"/>
+              <a:t> uniquement lorsque l’on merge une </a:t>
+            </a:r>
+            <a:r>
+              <a:rPr lang="fr-CH" dirty="0" err="1"/>
+              <a:t>branch</a:t>
+            </a:r>
+            <a:r>
+              <a:rPr lang="fr-CH" dirty="0"/>
+              <a:t> sur le main avec un tag spécifique. Ce qui c’est avéré impossible. Notre solution alternative a donc été de déployé que lorsque l’on push un tag sur main.</a:t>
+            </a:r>
+          </a:p>
+          <a:p>
+            <a:endParaRPr lang="fr-CH" dirty="0"/>
+          </a:p>
+          <a:p>
+            <a:r>
+              <a:rPr lang="fr-CH" dirty="0"/>
+              <a:t>Nous voulions prendre des images custom, mais ceci n’</a:t>
+            </a:r>
+            <a:r>
+              <a:rPr lang="fr-CH" dirty="0" err="1"/>
+              <a:t>etant</a:t>
+            </a:r>
+            <a:r>
+              <a:rPr lang="fr-CH" dirty="0"/>
+              <a:t> pas la chose la plus prioritaire, nous avons pour l’instant scanner et utiliser les images du jeu de base, malgré le fait que celles-ci sont très probablement pas libre de droit</a:t>
+            </a:r>
+          </a:p>
+        </p:txBody>
+      </p:sp>
+      <p:sp>
+        <p:nvSpPr>
+          <p:cNvPr id="4" name="Espace réservé du numéro de diapositive 3"/>
+          <p:cNvSpPr>
+            <a:spLocks noGrp="1"/>
+          </p:cNvSpPr>
+          <p:nvPr>
+            <p:ph type="sldNum" sz="quarter" idx="5"/>
+          </p:nvPr>
+        </p:nvSpPr>
+        <p:spPr/>
+        <p:txBody>
+          <a:bodyPr/>
+          <a:lstStyle/>
+          <a:p>
+            <a:fld id="{5E0A905D-A60E-43A0-853E-C1E62C61160C}" type="slidenum">
+              <a:rPr lang="fr-CH" smtClean="0"/>
+              <a:t>10</a:t>
+            </a:fld>
+            <a:endParaRPr lang="fr-CH"/>
+          </a:p>
+        </p:txBody>
+      </p:sp>
+    </p:spTree>
+    <p:extLst>
+      <p:ext uri="{BB962C8B-B14F-4D97-AF65-F5344CB8AC3E}">
+        <p14:creationId xmlns:p14="http://schemas.microsoft.com/office/powerpoint/2010/main" val="3575162479"/>
+      </p:ext>
+    </p:extLst>
+  </p:cSld>
+  <p:clrMapOvr>
+    <a:masterClrMapping/>
+  </p:clrMapOvr>
+</p:notes>
+</file>
+
+<file path=ppt/notesSlides/notesSlide3.xml><?xml version="1.0" encoding="utf-8"?>
+<p:notes xmlns:a="http://schemas.openxmlformats.org/drawingml/2006/main" xmlns:r="http://schemas.openxmlformats.org/officeDocument/2006/relationships" xmlns:p="http://schemas.openxmlformats.org/presentationml/2006/main">
+  <p:cSld>
+    <p:spTree>
+      <p:nvGrpSpPr>
+        <p:cNvPr id="1" name=""/>
+        <p:cNvGrpSpPr/>
+        <p:nvPr/>
+      </p:nvGrpSpPr>
+      <p:grpSpPr>
+        <a:xfrm>
+          <a:off x="0" y="0"/>
+          <a:ext cx="0" cy="0"/>
+          <a:chOff x="0" y="0"/>
+          <a:chExt cx="0" cy="0"/>
+        </a:xfrm>
+      </p:grpSpPr>
+      <p:sp>
+        <p:nvSpPr>
+          <p:cNvPr id="2" name="Espace réservé de l'image des diapositives 1"/>
+          <p:cNvSpPr>
+            <a:spLocks noGrp="1" noRot="1" noChangeAspect="1"/>
+          </p:cNvSpPr>
+          <p:nvPr>
+            <p:ph type="sldImg"/>
+          </p:nvPr>
+        </p:nvSpPr>
+        <p:spPr/>
+      </p:sp>
+      <p:sp>
+        <p:nvSpPr>
+          <p:cNvPr id="3" name="Espace réservé des notes 2"/>
+          <p:cNvSpPr>
+            <a:spLocks noGrp="1"/>
+          </p:cNvSpPr>
+          <p:nvPr>
+            <p:ph type="body" idx="1"/>
+          </p:nvPr>
+        </p:nvSpPr>
+        <p:spPr/>
+        <p:txBody>
+          <a:bodyPr/>
+          <a:lstStyle/>
+          <a:p>
+            <a:r>
+              <a:rPr lang="fr-CH" dirty="0"/>
+              <a:t>Nous sommes satisfait du travail fourni. Le départ était relativement lent, mais une fois que l’architecture était mise en place, le travail à été grandement accélérer. De plus, la structure du code permet un ajout relativement facile de nouvelles fonctionnalités.</a:t>
+            </a:r>
+          </a:p>
+        </p:txBody>
+      </p:sp>
+      <p:sp>
+        <p:nvSpPr>
+          <p:cNvPr id="4" name="Espace réservé du numéro de diapositive 3"/>
+          <p:cNvSpPr>
+            <a:spLocks noGrp="1"/>
+          </p:cNvSpPr>
+          <p:nvPr>
+            <p:ph type="sldNum" sz="quarter" idx="5"/>
+          </p:nvPr>
+        </p:nvSpPr>
+        <p:spPr/>
+        <p:txBody>
+          <a:bodyPr/>
+          <a:lstStyle/>
+          <a:p>
+            <a:fld id="{5E0A905D-A60E-43A0-853E-C1E62C61160C}" type="slidenum">
+              <a:rPr lang="fr-CH" smtClean="0"/>
+              <a:t>11</a:t>
+            </a:fld>
+            <a:endParaRPr lang="fr-CH"/>
+          </a:p>
+        </p:txBody>
+      </p:sp>
+    </p:spTree>
+    <p:extLst>
+      <p:ext uri="{BB962C8B-B14F-4D97-AF65-F5344CB8AC3E}">
+        <p14:creationId xmlns:p14="http://schemas.microsoft.com/office/powerpoint/2010/main" val="869219535"/>
+      </p:ext>
+    </p:extLst>
+  </p:cSld>
+  <p:clrMapOvr>
+    <a:masterClrMapping/>
+  </p:clrMapOvr>
+</p:notes>
+</file>
+
 <file path=ppt/slideLayouts/slideLayout1.xml><?xml version="1.0" encoding="utf-8"?>
 <p:sldLayout xmlns:a="http://schemas.openxmlformats.org/drawingml/2006/main" xmlns:r="http://schemas.openxmlformats.org/officeDocument/2006/relationships" xmlns:p="http://schemas.openxmlformats.org/presentationml/2006/main" showMasterSp="0" type="title" preserve="1">
   <p:cSld name="Diapositive de titre">
@@ -1332,7 +2130,7 @@
           <a:p>
             <a:fld id="{DCADBE15-701B-4245-899D-71259B1CD640}" type="datetimeFigureOut">
               <a:rPr lang="fr-CH" smtClean="0"/>
-              <a:t>05.09.2022</a:t>
+              <a:t>06.09.2022</a:t>
             </a:fld>
             <a:endParaRPr lang="fr-CH"/>
           </a:p>
@@ -1583,7 +2381,7 @@
           <a:p>
             <a:fld id="{DCADBE15-701B-4245-899D-71259B1CD640}" type="datetimeFigureOut">
               <a:rPr lang="fr-CH" smtClean="0"/>
-              <a:t>05.09.2022</a:t>
+              <a:t>06.09.2022</a:t>
             </a:fld>
             <a:endParaRPr lang="fr-CH"/>
           </a:p>
@@ -1897,7 +2695,7 @@
           <a:p>
             <a:fld id="{DCADBE15-701B-4245-899D-71259B1CD640}" type="datetimeFigureOut">
               <a:rPr lang="fr-CH" smtClean="0"/>
-              <a:t>05.09.2022</a:t>
+              <a:t>06.09.2022</a:t>
             </a:fld>
             <a:endParaRPr lang="fr-CH"/>
           </a:p>
@@ -2230,7 +3028,7 @@
           <a:p>
             <a:fld id="{DCADBE15-701B-4245-899D-71259B1CD640}" type="datetimeFigureOut">
               <a:rPr lang="fr-CH" smtClean="0"/>
-              <a:t>05.09.2022</a:t>
+              <a:t>06.09.2022</a:t>
             </a:fld>
             <a:endParaRPr lang="fr-CH"/>
           </a:p>
@@ -2544,7 +3342,7 @@
           <a:p>
             <a:fld id="{DCADBE15-701B-4245-899D-71259B1CD640}" type="datetimeFigureOut">
               <a:rPr lang="fr-CH" smtClean="0"/>
-              <a:t>05.09.2022</a:t>
+              <a:t>06.09.2022</a:t>
             </a:fld>
             <a:endParaRPr lang="fr-CH"/>
           </a:p>
@@ -2937,7 +3735,7 @@
           <a:p>
             <a:fld id="{DCADBE15-701B-4245-899D-71259B1CD640}" type="datetimeFigureOut">
               <a:rPr lang="fr-CH" smtClean="0"/>
-              <a:t>05.09.2022</a:t>
+              <a:t>06.09.2022</a:t>
             </a:fld>
             <a:endParaRPr lang="fr-CH"/>
           </a:p>
@@ -3107,7 +3905,7 @@
           <a:p>
             <a:fld id="{DCADBE15-701B-4245-899D-71259B1CD640}" type="datetimeFigureOut">
               <a:rPr lang="fr-CH" smtClean="0"/>
-              <a:t>05.09.2022</a:t>
+              <a:t>06.09.2022</a:t>
             </a:fld>
             <a:endParaRPr lang="fr-CH"/>
           </a:p>
@@ -3287,7 +4085,7 @@
           <a:p>
             <a:fld id="{DCADBE15-701B-4245-899D-71259B1CD640}" type="datetimeFigureOut">
               <a:rPr lang="fr-CH" smtClean="0"/>
-              <a:t>05.09.2022</a:t>
+              <a:t>06.09.2022</a:t>
             </a:fld>
             <a:endParaRPr lang="fr-CH"/>
           </a:p>
@@ -3457,7 +4255,7 @@
           <a:p>
             <a:fld id="{DCADBE15-701B-4245-899D-71259B1CD640}" type="datetimeFigureOut">
               <a:rPr lang="fr-CH" smtClean="0"/>
-              <a:t>05.09.2022</a:t>
+              <a:t>06.09.2022</a:t>
             </a:fld>
             <a:endParaRPr lang="fr-CH"/>
           </a:p>
@@ -3704,7 +4502,7 @@
           <a:p>
             <a:fld id="{DCADBE15-701B-4245-899D-71259B1CD640}" type="datetimeFigureOut">
               <a:rPr lang="fr-CH" smtClean="0"/>
-              <a:t>05.09.2022</a:t>
+              <a:t>06.09.2022</a:t>
             </a:fld>
             <a:endParaRPr lang="fr-CH"/>
           </a:p>
@@ -3936,7 +4734,7 @@
           <a:p>
             <a:fld id="{DCADBE15-701B-4245-899D-71259B1CD640}" type="datetimeFigureOut">
               <a:rPr lang="fr-CH" smtClean="0"/>
-              <a:t>05.09.2022</a:t>
+              <a:t>06.09.2022</a:t>
             </a:fld>
             <a:endParaRPr lang="fr-CH"/>
           </a:p>
@@ -4310,7 +5108,7 @@
           <a:p>
             <a:fld id="{DCADBE15-701B-4245-899D-71259B1CD640}" type="datetimeFigureOut">
               <a:rPr lang="fr-CH" smtClean="0"/>
-              <a:t>05.09.2022</a:t>
+              <a:t>06.09.2022</a:t>
             </a:fld>
             <a:endParaRPr lang="fr-CH"/>
           </a:p>
@@ -4433,7 +5231,7 @@
           <a:p>
             <a:fld id="{DCADBE15-701B-4245-899D-71259B1CD640}" type="datetimeFigureOut">
               <a:rPr lang="fr-CH" smtClean="0"/>
-              <a:t>05.09.2022</a:t>
+              <a:t>06.09.2022</a:t>
             </a:fld>
             <a:endParaRPr lang="fr-CH"/>
           </a:p>
@@ -4528,7 +5326,7 @@
           <a:p>
             <a:fld id="{DCADBE15-701B-4245-899D-71259B1CD640}" type="datetimeFigureOut">
               <a:rPr lang="fr-CH" smtClean="0"/>
-              <a:t>05.09.2022</a:t>
+              <a:t>06.09.2022</a:t>
             </a:fld>
             <a:endParaRPr lang="fr-CH"/>
           </a:p>
@@ -4783,7 +5581,7 @@
           <a:p>
             <a:fld id="{DCADBE15-701B-4245-899D-71259B1CD640}" type="datetimeFigureOut">
               <a:rPr lang="fr-CH" smtClean="0"/>
-              <a:t>05.09.2022</a:t>
+              <a:t>06.09.2022</a:t>
             </a:fld>
             <a:endParaRPr lang="fr-CH"/>
           </a:p>
@@ -5088,7 +5886,7 @@
           <a:p>
             <a:fld id="{DCADBE15-701B-4245-899D-71259B1CD640}" type="datetimeFigureOut">
               <a:rPr lang="fr-CH" smtClean="0"/>
-              <a:t>05.09.2022</a:t>
+              <a:t>06.09.2022</a:t>
             </a:fld>
             <a:endParaRPr lang="fr-CH"/>
           </a:p>
@@ -5790,7 +6588,7 @@
           <a:p>
             <a:fld id="{DCADBE15-701B-4245-899D-71259B1CD640}" type="datetimeFigureOut">
               <a:rPr lang="fr-CH" smtClean="0"/>
-              <a:t>05.09.2022</a:t>
+              <a:t>06.09.2022</a:t>
             </a:fld>
             <a:endParaRPr lang="fr-CH"/>
           </a:p>
@@ -6400,6 +7198,523 @@
 </file>
 
 <file path=ppt/slides/slide10.xml><?xml version="1.0" encoding="utf-8"?>
+<p:sld xmlns:a="http://schemas.openxmlformats.org/drawingml/2006/main" xmlns:r="http://schemas.openxmlformats.org/officeDocument/2006/relationships" xmlns:p="http://schemas.openxmlformats.org/presentationml/2006/main">
+  <p:cSld>
+    <p:spTree>
+      <p:nvGrpSpPr>
+        <p:cNvPr id="1" name=""/>
+        <p:cNvGrpSpPr/>
+        <p:nvPr/>
+      </p:nvGrpSpPr>
+      <p:grpSpPr>
+        <a:xfrm>
+          <a:off x="0" y="0"/>
+          <a:ext cx="0" cy="0"/>
+          <a:chOff x="0" y="0"/>
+          <a:chExt cx="0" cy="0"/>
+        </a:xfrm>
+      </p:grpSpPr>
+      <p:sp>
+        <p:nvSpPr>
+          <p:cNvPr id="2" name="Titre 1">
+            <a:extLst>
+              <a:ext uri="{FF2B5EF4-FFF2-40B4-BE49-F238E27FC236}">
+                <a16:creationId xmlns:a16="http://schemas.microsoft.com/office/drawing/2014/main" id="{1B3FFF55-C435-6E5F-BA90-8C2F392979BA}"/>
+              </a:ext>
+            </a:extLst>
+          </p:cNvPr>
+          <p:cNvSpPr>
+            <a:spLocks noGrp="1"/>
+          </p:cNvSpPr>
+          <p:nvPr>
+            <p:ph type="title"/>
+          </p:nvPr>
+        </p:nvSpPr>
+        <p:spPr/>
+        <p:txBody>
+          <a:bodyPr/>
+          <a:lstStyle/>
+          <a:p>
+            <a:r>
+              <a:rPr lang="fr-CH" dirty="0"/>
+              <a:t>Problèmes &amp; Solutions</a:t>
+            </a:r>
+          </a:p>
+        </p:txBody>
+      </p:sp>
+      <p:sp>
+        <p:nvSpPr>
+          <p:cNvPr id="3" name="Espace réservé du contenu 2">
+            <a:extLst>
+              <a:ext uri="{FF2B5EF4-FFF2-40B4-BE49-F238E27FC236}">
+                <a16:creationId xmlns:a16="http://schemas.microsoft.com/office/drawing/2014/main" id="{319A1FA8-D5B5-77A4-126F-FB26130131B2}"/>
+              </a:ext>
+            </a:extLst>
+          </p:cNvPr>
+          <p:cNvSpPr>
+            <a:spLocks noGrp="1"/>
+          </p:cNvSpPr>
+          <p:nvPr>
+            <p:ph idx="1"/>
+          </p:nvPr>
+        </p:nvSpPr>
+        <p:spPr>
+          <a:xfrm>
+            <a:off x="5241757" y="2312988"/>
+            <a:ext cx="3918729" cy="3880773"/>
+          </a:xfrm>
+        </p:spPr>
+        <p:txBody>
+          <a:bodyPr/>
+          <a:lstStyle/>
+          <a:p>
+            <a:r>
+              <a:rPr lang="fr-CH" dirty="0"/>
+              <a:t>Crée notre propre architecture</a:t>
+            </a:r>
+          </a:p>
+          <a:p>
+            <a:r>
+              <a:rPr lang="fr-CH" dirty="0"/>
+              <a:t>Tout mettre sur une page</a:t>
+            </a:r>
+          </a:p>
+          <a:p>
+            <a:r>
+              <a:rPr lang="fr-CH" dirty="0"/>
+              <a:t>Refonte de tout le code</a:t>
+            </a:r>
+          </a:p>
+          <a:p>
+            <a:r>
+              <a:rPr lang="fr-CH" dirty="0"/>
+              <a:t>Push de tag obligatoire</a:t>
+            </a:r>
+          </a:p>
+          <a:p>
+            <a:r>
+              <a:rPr lang="fr-CH" dirty="0"/>
+              <a:t>Reprise des images du jeu</a:t>
+            </a:r>
+          </a:p>
+        </p:txBody>
+      </p:sp>
+      <p:sp>
+        <p:nvSpPr>
+          <p:cNvPr id="4" name="Espace réservé du contenu 2">
+            <a:extLst>
+              <a:ext uri="{FF2B5EF4-FFF2-40B4-BE49-F238E27FC236}">
+                <a16:creationId xmlns:a16="http://schemas.microsoft.com/office/drawing/2014/main" id="{3C849D8D-1BBB-C8E7-F660-D07BBCDFF137}"/>
+              </a:ext>
+            </a:extLst>
+          </p:cNvPr>
+          <p:cNvSpPr txBox="1">
+            <a:spLocks/>
+          </p:cNvSpPr>
+          <p:nvPr/>
+        </p:nvSpPr>
+        <p:spPr>
+          <a:xfrm>
+            <a:off x="829734" y="2312989"/>
+            <a:ext cx="3918729" cy="3880773"/>
+          </a:xfrm>
+          <a:prstGeom prst="rect">
+            <a:avLst/>
+          </a:prstGeom>
+        </p:spPr>
+        <p:txBody>
+          <a:bodyPr vert="horz" lIns="91440" tIns="45720" rIns="91440" bIns="45720" rtlCol="0">
+            <a:normAutofit/>
+          </a:bodyPr>
+          <a:lstStyle>
+            <a:lvl1pPr marL="342900" indent="-342900" algn="l" defTabSz="457200" rtl="0" eaLnBrk="1" latinLnBrk="0" hangingPunct="1">
+              <a:spcBef>
+                <a:spcPts val="1000"/>
+              </a:spcBef>
+              <a:spcAft>
+                <a:spcPts val="0"/>
+              </a:spcAft>
+              <a:buClr>
+                <a:schemeClr val="accent1"/>
+              </a:buClr>
+              <a:buSzPct val="80000"/>
+              <a:buFont typeface="Wingdings 3" charset="2"/>
+              <a:buChar char=""/>
+              <a:defRPr sz="1800" kern="1200">
+                <a:solidFill>
+                  <a:schemeClr val="tx1">
+                    <a:lumMod val="75000"/>
+                    <a:lumOff val="25000"/>
+                  </a:schemeClr>
+                </a:solidFill>
+                <a:latin typeface="+mn-lt"/>
+                <a:ea typeface="+mn-ea"/>
+                <a:cs typeface="+mn-cs"/>
+              </a:defRPr>
+            </a:lvl1pPr>
+            <a:lvl2pPr marL="742950" indent="-285750" algn="l" defTabSz="457200" rtl="0" eaLnBrk="1" latinLnBrk="0" hangingPunct="1">
+              <a:spcBef>
+                <a:spcPts val="1000"/>
+              </a:spcBef>
+              <a:spcAft>
+                <a:spcPts val="0"/>
+              </a:spcAft>
+              <a:buClr>
+                <a:schemeClr val="accent1"/>
+              </a:buClr>
+              <a:buSzPct val="80000"/>
+              <a:buFont typeface="Wingdings 3" charset="2"/>
+              <a:buChar char=""/>
+              <a:defRPr sz="1600" kern="1200">
+                <a:solidFill>
+                  <a:schemeClr val="tx1">
+                    <a:lumMod val="75000"/>
+                    <a:lumOff val="25000"/>
+                  </a:schemeClr>
+                </a:solidFill>
+                <a:latin typeface="+mn-lt"/>
+                <a:ea typeface="+mn-ea"/>
+                <a:cs typeface="+mn-cs"/>
+              </a:defRPr>
+            </a:lvl2pPr>
+            <a:lvl3pPr marL="1143000" indent="-228600" algn="l" defTabSz="457200" rtl="0" eaLnBrk="1" latinLnBrk="0" hangingPunct="1">
+              <a:spcBef>
+                <a:spcPts val="1000"/>
+              </a:spcBef>
+              <a:spcAft>
+                <a:spcPts val="0"/>
+              </a:spcAft>
+              <a:buClr>
+                <a:schemeClr val="accent1"/>
+              </a:buClr>
+              <a:buSzPct val="80000"/>
+              <a:buFont typeface="Wingdings 3" charset="2"/>
+              <a:buChar char=""/>
+              <a:defRPr sz="1400" kern="1200">
+                <a:solidFill>
+                  <a:schemeClr val="tx1">
+                    <a:lumMod val="75000"/>
+                    <a:lumOff val="25000"/>
+                  </a:schemeClr>
+                </a:solidFill>
+                <a:latin typeface="+mn-lt"/>
+                <a:ea typeface="+mn-ea"/>
+                <a:cs typeface="+mn-cs"/>
+              </a:defRPr>
+            </a:lvl3pPr>
+            <a:lvl4pPr marL="1600200" indent="-228600" algn="l" defTabSz="457200" rtl="0" eaLnBrk="1" latinLnBrk="0" hangingPunct="1">
+              <a:spcBef>
+                <a:spcPts val="1000"/>
+              </a:spcBef>
+              <a:spcAft>
+                <a:spcPts val="0"/>
+              </a:spcAft>
+              <a:buClr>
+                <a:schemeClr val="accent1"/>
+              </a:buClr>
+              <a:buSzPct val="80000"/>
+              <a:buFont typeface="Wingdings 3" charset="2"/>
+              <a:buChar char=""/>
+              <a:defRPr sz="1200" kern="1200">
+                <a:solidFill>
+                  <a:schemeClr val="tx1">
+                    <a:lumMod val="75000"/>
+                    <a:lumOff val="25000"/>
+                  </a:schemeClr>
+                </a:solidFill>
+                <a:latin typeface="+mn-lt"/>
+                <a:ea typeface="+mn-ea"/>
+                <a:cs typeface="+mn-cs"/>
+              </a:defRPr>
+            </a:lvl4pPr>
+            <a:lvl5pPr marL="2057400" indent="-228600" algn="l" defTabSz="457200" rtl="0" eaLnBrk="1" latinLnBrk="0" hangingPunct="1">
+              <a:spcBef>
+                <a:spcPts val="1000"/>
+              </a:spcBef>
+              <a:spcAft>
+                <a:spcPts val="0"/>
+              </a:spcAft>
+              <a:buClr>
+                <a:schemeClr val="accent1"/>
+              </a:buClr>
+              <a:buSzPct val="80000"/>
+              <a:buFont typeface="Wingdings 3" charset="2"/>
+              <a:buChar char=""/>
+              <a:defRPr sz="1200" kern="1200">
+                <a:solidFill>
+                  <a:schemeClr val="tx1">
+                    <a:lumMod val="75000"/>
+                    <a:lumOff val="25000"/>
+                  </a:schemeClr>
+                </a:solidFill>
+                <a:latin typeface="+mn-lt"/>
+                <a:ea typeface="+mn-ea"/>
+                <a:cs typeface="+mn-cs"/>
+              </a:defRPr>
+            </a:lvl5pPr>
+            <a:lvl6pPr marL="2514600" indent="-228600" algn="l" defTabSz="457200" rtl="0" eaLnBrk="1" latinLnBrk="0" hangingPunct="1">
+              <a:spcBef>
+                <a:spcPts val="1000"/>
+              </a:spcBef>
+              <a:spcAft>
+                <a:spcPts val="0"/>
+              </a:spcAft>
+              <a:buClr>
+                <a:schemeClr val="accent1"/>
+              </a:buClr>
+              <a:buSzPct val="80000"/>
+              <a:buFont typeface="Wingdings 3" charset="2"/>
+              <a:buChar char=""/>
+              <a:defRPr sz="1200" kern="1200">
+                <a:solidFill>
+                  <a:schemeClr val="tx1">
+                    <a:lumMod val="75000"/>
+                    <a:lumOff val="25000"/>
+                  </a:schemeClr>
+                </a:solidFill>
+                <a:latin typeface="+mn-lt"/>
+                <a:ea typeface="+mn-ea"/>
+                <a:cs typeface="+mn-cs"/>
+              </a:defRPr>
+            </a:lvl6pPr>
+            <a:lvl7pPr marL="2971800" indent="-228600" algn="l" defTabSz="457200" rtl="0" eaLnBrk="1" latinLnBrk="0" hangingPunct="1">
+              <a:spcBef>
+                <a:spcPts val="1000"/>
+              </a:spcBef>
+              <a:spcAft>
+                <a:spcPts val="0"/>
+              </a:spcAft>
+              <a:buClr>
+                <a:schemeClr val="accent1"/>
+              </a:buClr>
+              <a:buSzPct val="80000"/>
+              <a:buFont typeface="Wingdings 3" charset="2"/>
+              <a:buChar char=""/>
+              <a:defRPr sz="1200" kern="1200">
+                <a:solidFill>
+                  <a:schemeClr val="tx1">
+                    <a:lumMod val="75000"/>
+                    <a:lumOff val="25000"/>
+                  </a:schemeClr>
+                </a:solidFill>
+                <a:latin typeface="+mn-lt"/>
+                <a:ea typeface="+mn-ea"/>
+                <a:cs typeface="+mn-cs"/>
+              </a:defRPr>
+            </a:lvl7pPr>
+            <a:lvl8pPr marL="3429000" indent="-228600" algn="l" defTabSz="457200" rtl="0" eaLnBrk="1" latinLnBrk="0" hangingPunct="1">
+              <a:spcBef>
+                <a:spcPts val="1000"/>
+              </a:spcBef>
+              <a:spcAft>
+                <a:spcPts val="0"/>
+              </a:spcAft>
+              <a:buClr>
+                <a:schemeClr val="accent1"/>
+              </a:buClr>
+              <a:buSzPct val="80000"/>
+              <a:buFont typeface="Wingdings 3" charset="2"/>
+              <a:buChar char=""/>
+              <a:defRPr sz="1200" kern="1200">
+                <a:solidFill>
+                  <a:schemeClr val="tx1">
+                    <a:lumMod val="75000"/>
+                    <a:lumOff val="25000"/>
+                  </a:schemeClr>
+                </a:solidFill>
+                <a:latin typeface="+mn-lt"/>
+                <a:ea typeface="+mn-ea"/>
+                <a:cs typeface="+mn-cs"/>
+              </a:defRPr>
+            </a:lvl8pPr>
+            <a:lvl9pPr marL="3886200" indent="-228600" algn="l" defTabSz="457200" rtl="0" eaLnBrk="1" latinLnBrk="0" hangingPunct="1">
+              <a:spcBef>
+                <a:spcPts val="1000"/>
+              </a:spcBef>
+              <a:spcAft>
+                <a:spcPts val="0"/>
+              </a:spcAft>
+              <a:buClr>
+                <a:schemeClr val="accent1"/>
+              </a:buClr>
+              <a:buSzPct val="80000"/>
+              <a:buFont typeface="Wingdings 3" charset="2"/>
+              <a:buChar char=""/>
+              <a:defRPr sz="1200" kern="1200">
+                <a:solidFill>
+                  <a:schemeClr val="tx1">
+                    <a:lumMod val="75000"/>
+                    <a:lumOff val="25000"/>
+                  </a:schemeClr>
+                </a:solidFill>
+                <a:latin typeface="+mn-lt"/>
+                <a:ea typeface="+mn-ea"/>
+                <a:cs typeface="+mn-cs"/>
+              </a:defRPr>
+            </a:lvl9pPr>
+          </a:lstStyle>
+          <a:p>
+            <a:r>
+              <a:rPr lang="fr-CH" dirty="0"/>
+              <a:t>Mise en place de l’infrastructure</a:t>
+            </a:r>
+          </a:p>
+          <a:p>
+            <a:r>
+              <a:rPr lang="fr-CH" dirty="0"/>
+              <a:t>Utilisation </a:t>
+            </a:r>
+            <a:r>
+              <a:rPr lang="fr-CH" dirty="0" err="1"/>
+              <a:t>SignalR</a:t>
+            </a:r>
+            <a:r>
+              <a:rPr lang="fr-CH" dirty="0"/>
+              <a:t> / </a:t>
+            </a:r>
+            <a:r>
+              <a:rPr lang="fr-CH" dirty="0" err="1"/>
+              <a:t>Blazor</a:t>
+            </a:r>
+            <a:endParaRPr lang="fr-CH" dirty="0"/>
+          </a:p>
+          <a:p>
+            <a:r>
+              <a:rPr lang="fr-CH" dirty="0"/>
+              <a:t>Architecture de l’application</a:t>
+            </a:r>
+          </a:p>
+          <a:p>
+            <a:r>
+              <a:rPr lang="fr-CH" dirty="0"/>
+              <a:t>Problème de CI/CD</a:t>
+            </a:r>
+          </a:p>
+          <a:p>
+            <a:r>
+              <a:rPr lang="fr-CH" dirty="0"/>
+              <a:t>Trouver des images</a:t>
+            </a:r>
+          </a:p>
+        </p:txBody>
+      </p:sp>
+    </p:spTree>
+    <p:extLst>
+      <p:ext uri="{BB962C8B-B14F-4D97-AF65-F5344CB8AC3E}">
+        <p14:creationId xmlns:p14="http://schemas.microsoft.com/office/powerpoint/2010/main" val="3935153276"/>
+      </p:ext>
+    </p:extLst>
+  </p:cSld>
+  <p:clrMapOvr>
+    <a:masterClrMapping/>
+  </p:clrMapOvr>
+</p:sld>
+</file>
+
+<file path=ppt/slides/slide11.xml><?xml version="1.0" encoding="utf-8"?>
+<p:sld xmlns:a="http://schemas.openxmlformats.org/drawingml/2006/main" xmlns:r="http://schemas.openxmlformats.org/officeDocument/2006/relationships" xmlns:p="http://schemas.openxmlformats.org/presentationml/2006/main">
+  <p:cSld>
+    <p:spTree>
+      <p:nvGrpSpPr>
+        <p:cNvPr id="1" name=""/>
+        <p:cNvGrpSpPr/>
+        <p:nvPr/>
+      </p:nvGrpSpPr>
+      <p:grpSpPr>
+        <a:xfrm>
+          <a:off x="0" y="0"/>
+          <a:ext cx="0" cy="0"/>
+          <a:chOff x="0" y="0"/>
+          <a:chExt cx="0" cy="0"/>
+        </a:xfrm>
+      </p:grpSpPr>
+      <p:sp>
+        <p:nvSpPr>
+          <p:cNvPr id="2" name="Titre 1">
+            <a:extLst>
+              <a:ext uri="{FF2B5EF4-FFF2-40B4-BE49-F238E27FC236}">
+                <a16:creationId xmlns:a16="http://schemas.microsoft.com/office/drawing/2014/main" id="{52B03804-5DE5-941F-E047-EE0E067933A0}"/>
+              </a:ext>
+            </a:extLst>
+          </p:cNvPr>
+          <p:cNvSpPr>
+            <a:spLocks noGrp="1"/>
+          </p:cNvSpPr>
+          <p:nvPr>
+            <p:ph type="title"/>
+          </p:nvPr>
+        </p:nvSpPr>
+        <p:spPr/>
+        <p:txBody>
+          <a:bodyPr/>
+          <a:lstStyle/>
+          <a:p>
+            <a:r>
+              <a:rPr lang="fr-CH" dirty="0"/>
+              <a:t>Conclusion</a:t>
+            </a:r>
+          </a:p>
+        </p:txBody>
+      </p:sp>
+      <p:sp>
+        <p:nvSpPr>
+          <p:cNvPr id="3" name="Espace réservé du contenu 2">
+            <a:extLst>
+              <a:ext uri="{FF2B5EF4-FFF2-40B4-BE49-F238E27FC236}">
+                <a16:creationId xmlns:a16="http://schemas.microsoft.com/office/drawing/2014/main" id="{3605302F-CB05-DDDC-ABED-BADA353CB1CC}"/>
+              </a:ext>
+            </a:extLst>
+          </p:cNvPr>
+          <p:cNvSpPr>
+            <a:spLocks noGrp="1"/>
+          </p:cNvSpPr>
+          <p:nvPr>
+            <p:ph idx="1"/>
+          </p:nvPr>
+        </p:nvSpPr>
+        <p:spPr/>
+        <p:txBody>
+          <a:bodyPr/>
+          <a:lstStyle/>
+          <a:p>
+            <a:r>
+              <a:rPr lang="fr-CH" dirty="0"/>
+              <a:t>Content du résultat</a:t>
+            </a:r>
+          </a:p>
+          <a:p>
+            <a:r>
+              <a:rPr lang="fr-CH" dirty="0"/>
+              <a:t>Jeu de base fonctionnel</a:t>
+            </a:r>
+          </a:p>
+          <a:p>
+            <a:r>
+              <a:rPr lang="fr-CH" dirty="0"/>
+              <a:t>Jeu facilement </a:t>
+            </a:r>
+            <a:r>
+              <a:rPr lang="fr-CH" dirty="0" err="1"/>
+              <a:t>continuable</a:t>
+            </a:r>
+            <a:endParaRPr lang="fr-CH" dirty="0"/>
+          </a:p>
+        </p:txBody>
+      </p:sp>
+    </p:spTree>
+    <p:extLst>
+      <p:ext uri="{BB962C8B-B14F-4D97-AF65-F5344CB8AC3E}">
+        <p14:creationId xmlns:p14="http://schemas.microsoft.com/office/powerpoint/2010/main" val="3088779766"/>
+      </p:ext>
+    </p:extLst>
+  </p:cSld>
+  <p:clrMapOvr>
+    <a:masterClrMapping/>
+  </p:clrMapOvr>
+</p:sld>
+</file>
+
+<file path=ppt/slides/slide12.xml><?xml version="1.0" encoding="utf-8"?>
 <p:sld xmlns:a="http://schemas.openxmlformats.org/drawingml/2006/main" xmlns:r="http://schemas.openxmlformats.org/officeDocument/2006/relationships" xmlns:p="http://schemas.openxmlformats.org/presentationml/2006/main">
   <p:cSld>
     <p:spTree>
@@ -7820,15 +9135,6 @@
             </a:r>
           </a:p>
           <a:p>
-            <a:r>
-              <a:rPr lang="fr-CH" dirty="0"/>
-              <a:t>Personnalisation des parties limitée</a:t>
-            </a:r>
-          </a:p>
-          <a:p>
-            <a:endParaRPr lang="fr-CH" dirty="0"/>
-          </a:p>
-          <a:p>
             <a:pPr marL="0" indent="0">
               <a:buNone/>
             </a:pPr>
@@ -7979,19 +9285,50 @@
           <a:chExt cx="0" cy="0"/>
         </a:xfrm>
       </p:grpSpPr>
+      <p:sp>
+        <p:nvSpPr>
+          <p:cNvPr id="2" name="Titre 1">
+            <a:extLst>
+              <a:ext uri="{FF2B5EF4-FFF2-40B4-BE49-F238E27FC236}">
+                <a16:creationId xmlns:a16="http://schemas.microsoft.com/office/drawing/2014/main" id="{89C8E29D-EB44-B252-AC1C-C5C61E275BCE}"/>
+              </a:ext>
+            </a:extLst>
+          </p:cNvPr>
+          <p:cNvSpPr>
+            <a:spLocks noGrp="1"/>
+          </p:cNvSpPr>
+          <p:nvPr>
+            <p:ph type="title"/>
+          </p:nvPr>
+        </p:nvSpPr>
+        <p:spPr/>
+        <p:txBody>
+          <a:bodyPr/>
+          <a:lstStyle/>
+          <a:p>
+            <a:r>
+              <a:rPr lang="fr-CH"/>
+              <a:t>Derrière les décors</a:t>
+            </a:r>
+            <a:endParaRPr lang="fr-CH" dirty="0"/>
+          </a:p>
+        </p:txBody>
+      </p:sp>
       <p:pic>
         <p:nvPicPr>
-          <p:cNvPr id="4" name="Image 3">
+          <p:cNvPr id="5" name="Espace réservé du contenu 4">
             <a:extLst>
               <a:ext uri="{FF2B5EF4-FFF2-40B4-BE49-F238E27FC236}">
-                <a16:creationId xmlns:a16="http://schemas.microsoft.com/office/drawing/2014/main" id="{77FBEBB1-2E61-A728-93DE-FE39EB9B0732}"/>
+                <a16:creationId xmlns:a16="http://schemas.microsoft.com/office/drawing/2014/main" id="{712D4ED0-25F5-E572-2C6E-9A3D296618E4}"/>
               </a:ext>
             </a:extLst>
           </p:cNvPr>
           <p:cNvPicPr>
-            <a:picLocks noChangeAspect="1"/>
+            <a:picLocks noGrp="1" noChangeAspect="1"/>
           </p:cNvPicPr>
-          <p:nvPr/>
+          <p:nvPr>
+            <p:ph idx="1"/>
+          </p:nvPr>
         </p:nvPicPr>
         <p:blipFill>
           <a:blip r:embed="rId2">
@@ -8007,76 +9344,39 @@
         </p:blipFill>
         <p:spPr>
           <a:xfrm>
-            <a:off x="5781675" y="367401"/>
-            <a:ext cx="5944919" cy="6123198"/>
+            <a:off x="427653" y="1550729"/>
+            <a:ext cx="4649167" cy="4351338"/>
           </a:xfrm>
-          <a:prstGeom prst="rect">
-            <a:avLst/>
-          </a:prstGeom>
         </p:spPr>
       </p:pic>
-      <p:sp>
-        <p:nvSpPr>
-          <p:cNvPr id="2" name="Titre 1">
+      <p:pic>
+        <p:nvPicPr>
+          <p:cNvPr id="6" name="Image 5">
             <a:extLst>
               <a:ext uri="{FF2B5EF4-FFF2-40B4-BE49-F238E27FC236}">
-                <a16:creationId xmlns:a16="http://schemas.microsoft.com/office/drawing/2014/main" id="{89C8E29D-EB44-B252-AC1C-C5C61E275BCE}"/>
-              </a:ext>
-            </a:extLst>
-          </p:cNvPr>
-          <p:cNvSpPr>
-            <a:spLocks noGrp="1"/>
-          </p:cNvSpPr>
-          <p:nvPr>
-            <p:ph type="title"/>
-          </p:nvPr>
-        </p:nvSpPr>
-        <p:spPr/>
-        <p:txBody>
-          <a:bodyPr/>
-          <a:lstStyle/>
-          <a:p>
-            <a:r>
-              <a:rPr lang="fr-CH"/>
-              <a:t>Derrière les décors</a:t>
-            </a:r>
-            <a:endParaRPr lang="fr-CH" dirty="0"/>
-          </a:p>
-        </p:txBody>
-      </p:sp>
-      <p:pic>
-        <p:nvPicPr>
-          <p:cNvPr id="5" name="Espace réservé du contenu 4">
-            <a:extLst>
-              <a:ext uri="{FF2B5EF4-FFF2-40B4-BE49-F238E27FC236}">
-                <a16:creationId xmlns:a16="http://schemas.microsoft.com/office/drawing/2014/main" id="{712D4ED0-25F5-E572-2C6E-9A3D296618E4}"/>
+                <a16:creationId xmlns:a16="http://schemas.microsoft.com/office/drawing/2014/main" id="{71685130-966F-42A7-A86D-20C61AEA903B}"/>
               </a:ext>
             </a:extLst>
           </p:cNvPr>
           <p:cNvPicPr>
-            <a:picLocks noGrp="1" noChangeAspect="1"/>
+            <a:picLocks noChangeAspect="1"/>
           </p:cNvPicPr>
-          <p:nvPr>
-            <p:ph idx="1"/>
-          </p:nvPr>
+          <p:nvPr/>
         </p:nvPicPr>
         <p:blipFill>
-          <a:blip r:embed="rId3">
-            <a:extLst>
-              <a:ext uri="{28A0092B-C50C-407E-A947-70E740481C1C}">
-                <a14:useLocalDpi xmlns:a14="http://schemas.microsoft.com/office/drawing/2010/main" val="0"/>
-              </a:ext>
-            </a:extLst>
-          </a:blip>
+          <a:blip r:embed="rId3"/>
           <a:stretch>
             <a:fillRect/>
           </a:stretch>
         </p:blipFill>
         <p:spPr>
           <a:xfrm>
-            <a:off x="838200" y="1690688"/>
-            <a:ext cx="4649167" cy="4351338"/>
+            <a:off x="5326501" y="0"/>
+            <a:ext cx="5390800" cy="6858000"/>
           </a:xfrm>
+          <a:prstGeom prst="rect">
+            <a:avLst/>
+          </a:prstGeom>
         </p:spPr>
       </p:pic>
     </p:spTree>
@@ -8391,6 +9691,12 @@
             </a:r>
           </a:p>
           <a:p>
+            <a:r>
+              <a:rPr lang="fr-CH" dirty="0"/>
+              <a:t>Modification des règles</a:t>
+            </a:r>
+          </a:p>
+          <a:p>
             <a:endParaRPr lang="fr-CH" dirty="0"/>
           </a:p>
         </p:txBody>
@@ -8448,7 +9754,7 @@
           <a:p>
             <a:r>
               <a:rPr lang="fr-CH" dirty="0"/>
-              <a:t>Les problèmes rencontrés</a:t>
+              <a:t>Choix</a:t>
             </a:r>
           </a:p>
         </p:txBody>
@@ -8476,25 +9782,40 @@
           <a:p>
             <a:r>
               <a:rPr lang="fr-CH" dirty="0"/>
-              <a:t>Le partage des tâches</a:t>
-            </a:r>
-          </a:p>
-          <a:p>
-            <a:r>
-              <a:rPr lang="fr-CH" dirty="0"/>
-              <a:t>L’architecture de l’application défini trop tard</a:t>
-            </a:r>
-          </a:p>
-          <a:p>
-            <a:r>
-              <a:rPr lang="fr-CH" dirty="0"/>
-              <a:t>Manque de tests avec </a:t>
-            </a:r>
+              <a:t>C# et asp.net</a:t>
+            </a:r>
+          </a:p>
+          <a:p>
             <a:r>
               <a:rPr lang="fr-CH" dirty="0" err="1"/>
               <a:t>SignalR</a:t>
             </a:r>
+            <a:r>
+              <a:rPr lang="fr-CH" dirty="0"/>
+              <a:t> et </a:t>
+            </a:r>
+            <a:r>
+              <a:rPr lang="fr-CH" dirty="0" err="1"/>
+              <a:t>Blazor</a:t>
+            </a:r>
             <a:endParaRPr lang="fr-CH" dirty="0"/>
+          </a:p>
+          <a:p>
+            <a:endParaRPr lang="fr-CH" dirty="0"/>
+          </a:p>
+          <a:p>
+            <a:r>
+              <a:rPr lang="fr-CH" dirty="0"/>
+              <a:t>Ne pas accélérer le déploiement // TODO </a:t>
+            </a:r>
+            <a:r>
+              <a:rPr lang="fr-CH" dirty="0" err="1"/>
+              <a:t>cest</a:t>
+            </a:r>
+            <a:r>
+              <a:rPr lang="fr-CH" dirty="0"/>
+              <a:t> de la merde</a:t>
+            </a:r>
           </a:p>
         </p:txBody>
       </p:sp>
@@ -8766,4 +10087,299 @@
     </a:ext>
   </a:extLst>
 </a:theme>
+</file>
+
+<file path=ppt/theme/theme2.xml><?xml version="1.0" encoding="utf-8"?>
+<a:theme xmlns:a="http://schemas.openxmlformats.org/drawingml/2006/main" name="Thème Office">
+  <a:themeElements>
+    <a:clrScheme name="Office">
+      <a:dk1>
+        <a:sysClr val="windowText" lastClr="000000"/>
+      </a:dk1>
+      <a:lt1>
+        <a:sysClr val="window" lastClr="FFFFFF"/>
+      </a:lt1>
+      <a:dk2>
+        <a:srgbClr val="44546A"/>
+      </a:dk2>
+      <a:lt2>
+        <a:srgbClr val="E7E6E6"/>
+      </a:lt2>
+      <a:accent1>
+        <a:srgbClr val="4472C4"/>
+      </a:accent1>
+      <a:accent2>
+        <a:srgbClr val="ED7D31"/>
+      </a:accent2>
+      <a:accent3>
+        <a:srgbClr val="A5A5A5"/>
+      </a:accent3>
+      <a:accent4>
+        <a:srgbClr val="FFC000"/>
+      </a:accent4>
+      <a:accent5>
+        <a:srgbClr val="5B9BD5"/>
+      </a:accent5>
+      <a:accent6>
+        <a:srgbClr val="70AD47"/>
+      </a:accent6>
+      <a:hlink>
+        <a:srgbClr val="0563C1"/>
+      </a:hlink>
+      <a:folHlink>
+        <a:srgbClr val="954F72"/>
+      </a:folHlink>
+    </a:clrScheme>
+    <a:fontScheme name="Office">
+      <a:majorFont>
+        <a:latin typeface="Calibri Light" panose="020F0302020204030204"/>
+        <a:ea typeface=""/>
+        <a:cs typeface=""/>
+        <a:font script="Jpan" typeface="游ゴシック Light"/>
+        <a:font script="Hang" typeface="맑은 고딕"/>
+        <a:font script="Hans" typeface="等线 Light"/>
+        <a:font script="Hant" typeface="新細明體"/>
+        <a:font script="Arab" typeface="Times New Roman"/>
+        <a:font script="Hebr" typeface="Times New Roman"/>
+        <a:font script="Thai" typeface="Angsana New"/>
+        <a:font script="Ethi" typeface="Nyala"/>
+        <a:font script="Beng" typeface="Vrinda"/>
+        <a:font script="Gujr" typeface="Shruti"/>
+        <a:font script="Khmr" typeface="MoolBoran"/>
+        <a:font script="Knda" typeface="Tunga"/>
+        <a:font script="Guru" typeface="Raavi"/>
+        <a:font script="Cans" typeface="Euphemia"/>
+        <a:font script="Cher" typeface="Plantagenet Cherokee"/>
+        <a:font script="Yiii" typeface="Microsoft Yi Baiti"/>
+        <a:font script="Tibt" typeface="Microsoft Himalaya"/>
+        <a:font script="Thaa" typeface="MV Boli"/>
+        <a:font script="Deva" typeface="Mangal"/>
+        <a:font script="Telu" typeface="Gautami"/>
+        <a:font script="Taml" typeface="Latha"/>
+        <a:font script="Syrc" typeface="Estrangelo Edessa"/>
+        <a:font script="Orya" typeface="Kalinga"/>
+        <a:font script="Mlym" typeface="Kartika"/>
+        <a:font script="Laoo" typeface="DokChampa"/>
+        <a:font script="Sinh" typeface="Iskoola Pota"/>
+        <a:font script="Mong" typeface="Mongolian Baiti"/>
+        <a:font script="Viet" typeface="Times New Roman"/>
+        <a:font script="Uigh" typeface="Microsoft Uighur"/>
+        <a:font script="Geor" typeface="Sylfaen"/>
+        <a:font script="Armn" typeface="Arial"/>
+        <a:font script="Bugi" typeface="Leelawadee UI"/>
+        <a:font script="Bopo" typeface="Microsoft JhengHei"/>
+        <a:font script="Java" typeface="Javanese Text"/>
+        <a:font script="Lisu" typeface="Segoe UI"/>
+        <a:font script="Mymr" typeface="Myanmar Text"/>
+        <a:font script="Nkoo" typeface="Ebrima"/>
+        <a:font script="Olck" typeface="Nirmala UI"/>
+        <a:font script="Osma" typeface="Ebrima"/>
+        <a:font script="Phag" typeface="Phagspa"/>
+        <a:font script="Syrn" typeface="Estrangelo Edessa"/>
+        <a:font script="Syrj" typeface="Estrangelo Edessa"/>
+        <a:font script="Syre" typeface="Estrangelo Edessa"/>
+        <a:font script="Sora" typeface="Nirmala UI"/>
+        <a:font script="Tale" typeface="Microsoft Tai Le"/>
+        <a:font script="Talu" typeface="Microsoft New Tai Lue"/>
+        <a:font script="Tfng" typeface="Ebrima"/>
+      </a:majorFont>
+      <a:minorFont>
+        <a:latin typeface="Calibri" panose="020F0502020204030204"/>
+        <a:ea typeface=""/>
+        <a:cs typeface=""/>
+        <a:font script="Jpan" typeface="游ゴシック"/>
+        <a:font script="Hang" typeface="맑은 고딕"/>
+        <a:font script="Hans" typeface="等线"/>
+        <a:font script="Hant" typeface="新細明體"/>
+        <a:font script="Arab" typeface="Arial"/>
+        <a:font script="Hebr" typeface="Arial"/>
+        <a:font script="Thai" typeface="Cordia New"/>
+        <a:font script="Ethi" typeface="Nyala"/>
+        <a:font script="Beng" typeface="Vrinda"/>
+        <a:font script="Gujr" typeface="Shruti"/>
+        <a:font script="Khmr" typeface="DaunPenh"/>
+        <a:font script="Knda" typeface="Tunga"/>
+        <a:font script="Guru" typeface="Raavi"/>
+        <a:font script="Cans" typeface="Euphemia"/>
+        <a:font script="Cher" typeface="Plantagenet Cherokee"/>
+        <a:font script="Yiii" typeface="Microsoft Yi Baiti"/>
+        <a:font script="Tibt" typeface="Microsoft Himalaya"/>
+        <a:font script="Thaa" typeface="MV Boli"/>
+        <a:font script="Deva" typeface="Mangal"/>
+        <a:font script="Telu" typeface="Gautami"/>
+        <a:font script="Taml" typeface="Latha"/>
+        <a:font script="Syrc" typeface="Estrangelo Edessa"/>
+        <a:font script="Orya" typeface="Kalinga"/>
+        <a:font script="Mlym" typeface="Kartika"/>
+        <a:font script="Laoo" typeface="DokChampa"/>
+        <a:font script="Sinh" typeface="Iskoola Pota"/>
+        <a:font script="Mong" typeface="Mongolian Baiti"/>
+        <a:font script="Viet" typeface="Arial"/>
+        <a:font script="Uigh" typeface="Microsoft Uighur"/>
+        <a:font script="Geor" typeface="Sylfaen"/>
+        <a:font script="Armn" typeface="Arial"/>
+        <a:font script="Bugi" typeface="Leelawadee UI"/>
+        <a:font script="Bopo" typeface="Microsoft JhengHei"/>
+        <a:font script="Java" typeface="Javanese Text"/>
+        <a:font script="Lisu" typeface="Segoe UI"/>
+        <a:font script="Mymr" typeface="Myanmar Text"/>
+        <a:font script="Nkoo" typeface="Ebrima"/>
+        <a:font script="Olck" typeface="Nirmala UI"/>
+        <a:font script="Osma" typeface="Ebrima"/>
+        <a:font script="Phag" typeface="Phagspa"/>
+        <a:font script="Syrn" typeface="Estrangelo Edessa"/>
+        <a:font script="Syrj" typeface="Estrangelo Edessa"/>
+        <a:font script="Syre" typeface="Estrangelo Edessa"/>
+        <a:font script="Sora" typeface="Nirmala UI"/>
+        <a:font script="Tale" typeface="Microsoft Tai Le"/>
+        <a:font script="Talu" typeface="Microsoft New Tai Lue"/>
+        <a:font script="Tfng" typeface="Ebrima"/>
+      </a:minorFont>
+    </a:fontScheme>
+    <a:fmtScheme name="Office">
+      <a:fillStyleLst>
+        <a:solidFill>
+          <a:schemeClr val="phClr"/>
+        </a:solidFill>
+        <a:gradFill rotWithShape="1">
+          <a:gsLst>
+            <a:gs pos="0">
+              <a:schemeClr val="phClr">
+                <a:lumMod val="110000"/>
+                <a:satMod val="105000"/>
+                <a:tint val="67000"/>
+              </a:schemeClr>
+            </a:gs>
+            <a:gs pos="50000">
+              <a:schemeClr val="phClr">
+                <a:lumMod val="105000"/>
+                <a:satMod val="103000"/>
+                <a:tint val="73000"/>
+              </a:schemeClr>
+            </a:gs>
+            <a:gs pos="100000">
+              <a:schemeClr val="phClr">
+                <a:lumMod val="105000"/>
+                <a:satMod val="109000"/>
+                <a:tint val="81000"/>
+              </a:schemeClr>
+            </a:gs>
+          </a:gsLst>
+          <a:lin ang="5400000" scaled="0"/>
+        </a:gradFill>
+        <a:gradFill rotWithShape="1">
+          <a:gsLst>
+            <a:gs pos="0">
+              <a:schemeClr val="phClr">
+                <a:satMod val="103000"/>
+                <a:lumMod val="102000"/>
+                <a:tint val="94000"/>
+              </a:schemeClr>
+            </a:gs>
+            <a:gs pos="50000">
+              <a:schemeClr val="phClr">
+                <a:satMod val="110000"/>
+                <a:lumMod val="100000"/>
+                <a:shade val="100000"/>
+              </a:schemeClr>
+            </a:gs>
+            <a:gs pos="100000">
+              <a:schemeClr val="phClr">
+                <a:lumMod val="99000"/>
+                <a:satMod val="120000"/>
+                <a:shade val="78000"/>
+              </a:schemeClr>
+            </a:gs>
+          </a:gsLst>
+          <a:lin ang="5400000" scaled="0"/>
+        </a:gradFill>
+      </a:fillStyleLst>
+      <a:lnStyleLst>
+        <a:ln w="6350" cap="flat" cmpd="sng" algn="ctr">
+          <a:solidFill>
+            <a:schemeClr val="phClr"/>
+          </a:solidFill>
+          <a:prstDash val="solid"/>
+          <a:miter lim="800000"/>
+        </a:ln>
+        <a:ln w="12700" cap="flat" cmpd="sng" algn="ctr">
+          <a:solidFill>
+            <a:schemeClr val="phClr"/>
+          </a:solidFill>
+          <a:prstDash val="solid"/>
+          <a:miter lim="800000"/>
+        </a:ln>
+        <a:ln w="19050" cap="flat" cmpd="sng" algn="ctr">
+          <a:solidFill>
+            <a:schemeClr val="phClr"/>
+          </a:solidFill>
+          <a:prstDash val="solid"/>
+          <a:miter lim="800000"/>
+        </a:ln>
+      </a:lnStyleLst>
+      <a:effectStyleLst>
+        <a:effectStyle>
+          <a:effectLst/>
+        </a:effectStyle>
+        <a:effectStyle>
+          <a:effectLst/>
+        </a:effectStyle>
+        <a:effectStyle>
+          <a:effectLst>
+            <a:outerShdw blurRad="57150" dist="19050" dir="5400000" algn="ctr" rotWithShape="0">
+              <a:srgbClr val="000000">
+                <a:alpha val="63000"/>
+              </a:srgbClr>
+            </a:outerShdw>
+          </a:effectLst>
+        </a:effectStyle>
+      </a:effectStyleLst>
+      <a:bgFillStyleLst>
+        <a:solidFill>
+          <a:schemeClr val="phClr"/>
+        </a:solidFill>
+        <a:solidFill>
+          <a:schemeClr val="phClr">
+            <a:tint val="95000"/>
+            <a:satMod val="170000"/>
+          </a:schemeClr>
+        </a:solidFill>
+        <a:gradFill rotWithShape="1">
+          <a:gsLst>
+            <a:gs pos="0">
+              <a:schemeClr val="phClr">
+                <a:tint val="93000"/>
+                <a:satMod val="150000"/>
+                <a:shade val="98000"/>
+                <a:lumMod val="102000"/>
+              </a:schemeClr>
+            </a:gs>
+            <a:gs pos="50000">
+              <a:schemeClr val="phClr">
+                <a:tint val="98000"/>
+                <a:satMod val="130000"/>
+                <a:shade val="90000"/>
+                <a:lumMod val="103000"/>
+              </a:schemeClr>
+            </a:gs>
+            <a:gs pos="100000">
+              <a:schemeClr val="phClr">
+                <a:shade val="63000"/>
+                <a:satMod val="120000"/>
+              </a:schemeClr>
+            </a:gs>
+          </a:gsLst>
+          <a:lin ang="5400000" scaled="0"/>
+        </a:gradFill>
+      </a:bgFillStyleLst>
+    </a:fmtScheme>
+  </a:themeElements>
+  <a:objectDefaults/>
+  <a:extraClrSchemeLst/>
+  <a:extLst>
+    <a:ext uri="{05A4C25C-085E-4340-85A3-A5531E510DB2}">
+      <thm15:themeFamily xmlns:thm15="http://schemas.microsoft.com/office/thememl/2012/main" name="Office Theme" id="{62F939B6-93AF-4DB8-9C6B-D6C7DFDC589F}" vid="{4A3C46E8-61CC-4603-A589-7422A47A8E4A}"/>
+    </a:ext>
+  </a:extLst>
+</a:theme>
 </file>
</xml_diff>

<commit_message>
Mise en page de la présentation
</commit_message>
<xml_diff>
--- a/doc/King Skull Classic Online.pptx
+++ b/doc/King Skull Classic Online.pptx
@@ -5,8 +5,11 @@
     <p:sldMasterId id="2147483726" r:id="rId1"/>
   </p:sldMasterIdLst>
   <p:notesMasterIdLst>
-    <p:notesMasterId r:id="rId15"/>
+    <p:notesMasterId r:id="rId16"/>
   </p:notesMasterIdLst>
+  <p:handoutMasterIdLst>
+    <p:handoutMasterId r:id="rId17"/>
+  </p:handoutMasterIdLst>
   <p:sldIdLst>
     <p:sldId id="256" r:id="rId2"/>
     <p:sldId id="263" r:id="rId3"/>
@@ -14,13 +17,14 @@
     <p:sldId id="257" r:id="rId5"/>
     <p:sldId id="258" r:id="rId6"/>
     <p:sldId id="260" r:id="rId7"/>
-    <p:sldId id="261" r:id="rId8"/>
-    <p:sldId id="265" r:id="rId9"/>
-    <p:sldId id="264" r:id="rId10"/>
-    <p:sldId id="266" r:id="rId11"/>
-    <p:sldId id="267" r:id="rId12"/>
-    <p:sldId id="262" r:id="rId13"/>
-    <p:sldId id="268" r:id="rId14"/>
+    <p:sldId id="269" r:id="rId8"/>
+    <p:sldId id="261" r:id="rId9"/>
+    <p:sldId id="265" r:id="rId10"/>
+    <p:sldId id="264" r:id="rId11"/>
+    <p:sldId id="266" r:id="rId12"/>
+    <p:sldId id="267" r:id="rId13"/>
+    <p:sldId id="262" r:id="rId14"/>
+    <p:sldId id="268" r:id="rId15"/>
   </p:sldIdLst>
   <p:sldSz cx="12192000" cy="6858000"/>
   <p:notesSz cx="6858000" cy="9144000"/>
@@ -593,6 +597,195 @@
 </pc:chgInfo>
 </file>
 
+<file path=ppt/handoutMasters/handoutMaster1.xml><?xml version="1.0" encoding="utf-8"?>
+<p:handoutMaster xmlns:a="http://schemas.openxmlformats.org/drawingml/2006/main" xmlns:r="http://schemas.openxmlformats.org/officeDocument/2006/relationships" xmlns:p="http://schemas.openxmlformats.org/presentationml/2006/main">
+  <p:cSld>
+    <p:bg>
+      <p:bgRef idx="1001">
+        <a:schemeClr val="bg1"/>
+      </p:bgRef>
+    </p:bg>
+    <p:spTree>
+      <p:nvGrpSpPr>
+        <p:cNvPr id="1" name=""/>
+        <p:cNvGrpSpPr/>
+        <p:nvPr/>
+      </p:nvGrpSpPr>
+      <p:grpSpPr>
+        <a:xfrm>
+          <a:off x="0" y="0"/>
+          <a:ext cx="0" cy="0"/>
+          <a:chOff x="0" y="0"/>
+          <a:chExt cx="0" cy="0"/>
+        </a:xfrm>
+      </p:grpSpPr>
+      <p:sp>
+        <p:nvSpPr>
+          <p:cNvPr id="2" name="Espace réservé de l'en-tête 1">
+            <a:extLst>
+              <a:ext uri="{FF2B5EF4-FFF2-40B4-BE49-F238E27FC236}">
+                <a16:creationId xmlns:a16="http://schemas.microsoft.com/office/drawing/2014/main" id="{AA204A14-9CEC-8FB8-ABFE-000D7FB400DB}"/>
+              </a:ext>
+            </a:extLst>
+          </p:cNvPr>
+          <p:cNvSpPr>
+            <a:spLocks noGrp="1"/>
+          </p:cNvSpPr>
+          <p:nvPr>
+            <p:ph type="hdr" sz="quarter"/>
+          </p:nvPr>
+        </p:nvSpPr>
+        <p:spPr>
+          <a:xfrm>
+            <a:off x="0" y="0"/>
+            <a:ext cx="2971800" cy="458788"/>
+          </a:xfrm>
+          <a:prstGeom prst="rect">
+            <a:avLst/>
+          </a:prstGeom>
+        </p:spPr>
+        <p:txBody>
+          <a:bodyPr vert="horz" lIns="91440" tIns="45720" rIns="91440" bIns="45720" rtlCol="0"/>
+          <a:lstStyle>
+            <a:lvl1pPr algn="l">
+              <a:defRPr sz="1200"/>
+            </a:lvl1pPr>
+          </a:lstStyle>
+          <a:p>
+            <a:endParaRPr lang="fr-CH"/>
+          </a:p>
+        </p:txBody>
+      </p:sp>
+      <p:sp>
+        <p:nvSpPr>
+          <p:cNvPr id="3" name="Espace réservé de la date 2">
+            <a:extLst>
+              <a:ext uri="{FF2B5EF4-FFF2-40B4-BE49-F238E27FC236}">
+                <a16:creationId xmlns:a16="http://schemas.microsoft.com/office/drawing/2014/main" id="{6D1A5230-DCA1-EC42-478D-8535FA06885D}"/>
+              </a:ext>
+            </a:extLst>
+          </p:cNvPr>
+          <p:cNvSpPr>
+            <a:spLocks noGrp="1"/>
+          </p:cNvSpPr>
+          <p:nvPr>
+            <p:ph type="dt" sz="quarter" idx="1"/>
+          </p:nvPr>
+        </p:nvSpPr>
+        <p:spPr>
+          <a:xfrm>
+            <a:off x="3884613" y="0"/>
+            <a:ext cx="2971800" cy="458788"/>
+          </a:xfrm>
+          <a:prstGeom prst="rect">
+            <a:avLst/>
+          </a:prstGeom>
+        </p:spPr>
+        <p:txBody>
+          <a:bodyPr vert="horz" lIns="91440" tIns="45720" rIns="91440" bIns="45720" rtlCol="0"/>
+          <a:lstStyle>
+            <a:lvl1pPr algn="r">
+              <a:defRPr sz="1200"/>
+            </a:lvl1pPr>
+          </a:lstStyle>
+          <a:p>
+            <a:fld id="{45A414FF-BD3E-4DC5-8268-7CEBAB5B6E83}" type="datetimeFigureOut">
+              <a:rPr lang="fr-CH" smtClean="0"/>
+              <a:t>08.09.2022</a:t>
+            </a:fld>
+            <a:endParaRPr lang="fr-CH"/>
+          </a:p>
+        </p:txBody>
+      </p:sp>
+      <p:sp>
+        <p:nvSpPr>
+          <p:cNvPr id="4" name="Espace réservé du pied de page 3">
+            <a:extLst>
+              <a:ext uri="{FF2B5EF4-FFF2-40B4-BE49-F238E27FC236}">
+                <a16:creationId xmlns:a16="http://schemas.microsoft.com/office/drawing/2014/main" id="{498317B8-F105-8EE5-95B8-A0B6AAE98392}"/>
+              </a:ext>
+            </a:extLst>
+          </p:cNvPr>
+          <p:cNvSpPr>
+            <a:spLocks noGrp="1"/>
+          </p:cNvSpPr>
+          <p:nvPr>
+            <p:ph type="ftr" sz="quarter" idx="2"/>
+          </p:nvPr>
+        </p:nvSpPr>
+        <p:spPr>
+          <a:xfrm>
+            <a:off x="0" y="8685213"/>
+            <a:ext cx="2971800" cy="458787"/>
+          </a:xfrm>
+          <a:prstGeom prst="rect">
+            <a:avLst/>
+          </a:prstGeom>
+        </p:spPr>
+        <p:txBody>
+          <a:bodyPr vert="horz" lIns="91440" tIns="45720" rIns="91440" bIns="45720" rtlCol="0" anchor="b"/>
+          <a:lstStyle>
+            <a:lvl1pPr algn="l">
+              <a:defRPr sz="1200"/>
+            </a:lvl1pPr>
+          </a:lstStyle>
+          <a:p>
+            <a:endParaRPr lang="fr-CH"/>
+          </a:p>
+        </p:txBody>
+      </p:sp>
+      <p:sp>
+        <p:nvSpPr>
+          <p:cNvPr id="5" name="Espace réservé du numéro de diapositive 4">
+            <a:extLst>
+              <a:ext uri="{FF2B5EF4-FFF2-40B4-BE49-F238E27FC236}">
+                <a16:creationId xmlns:a16="http://schemas.microsoft.com/office/drawing/2014/main" id="{EB42FBCF-39AD-ECC0-88A1-8B81955CFE84}"/>
+              </a:ext>
+            </a:extLst>
+          </p:cNvPr>
+          <p:cNvSpPr>
+            <a:spLocks noGrp="1"/>
+          </p:cNvSpPr>
+          <p:nvPr>
+            <p:ph type="sldNum" sz="quarter" idx="3"/>
+          </p:nvPr>
+        </p:nvSpPr>
+        <p:spPr>
+          <a:xfrm>
+            <a:off x="3884613" y="8685213"/>
+            <a:ext cx="2971800" cy="458787"/>
+          </a:xfrm>
+          <a:prstGeom prst="rect">
+            <a:avLst/>
+          </a:prstGeom>
+        </p:spPr>
+        <p:txBody>
+          <a:bodyPr vert="horz" lIns="91440" tIns="45720" rIns="91440" bIns="45720" rtlCol="0" anchor="b"/>
+          <a:lstStyle>
+            <a:lvl1pPr algn="r">
+              <a:defRPr sz="1200"/>
+            </a:lvl1pPr>
+          </a:lstStyle>
+          <a:p>
+            <a:fld id="{262DD665-7F14-4BA0-B358-7436FAF679C0}" type="slidenum">
+              <a:rPr lang="fr-CH" smtClean="0"/>
+              <a:t>‹N°›</a:t>
+            </a:fld>
+            <a:endParaRPr lang="fr-CH"/>
+          </a:p>
+        </p:txBody>
+      </p:sp>
+    </p:spTree>
+    <p:extLst>
+      <p:ext uri="{BB962C8B-B14F-4D97-AF65-F5344CB8AC3E}">
+        <p14:creationId xmlns:p14="http://schemas.microsoft.com/office/powerpoint/2010/main" val="2859521837"/>
+      </p:ext>
+    </p:extLst>
+  </p:cSld>
+  <p:clrMap bg1="lt1" tx1="dk1" bg2="lt2" tx2="dk2" accent1="accent1" accent2="accent2" accent3="accent3" accent4="accent4" accent5="accent5" accent6="accent6" hlink="hlink" folHlink="folHlink"/>
+</p:handoutMaster>
+</file>
+
 <file path=ppt/ink/ink1.xml><?xml version="1.0" encoding="utf-8"?>
 <inkml:ink xmlns:inkml="http://www.w3.org/2003/InkML">
   <inkml:definitions>
@@ -1152,9 +1345,6 @@
           <a:bodyPr/>
           <a:lstStyle/>
           <a:p>
-            <a:pPr marL="0" indent="0">
-              <a:buNone/>
-            </a:pPr>
             <a:endParaRPr lang="fr-CH" dirty="0"/>
           </a:p>
         </p:txBody>
@@ -1185,7 +1375,7 @@
     </p:spTree>
     <p:extLst>
       <p:ext uri="{BB962C8B-B14F-4D97-AF65-F5344CB8AC3E}">
-        <p14:creationId xmlns:p14="http://schemas.microsoft.com/office/powerpoint/2010/main" val="628468887"/>
+        <p14:creationId xmlns:p14="http://schemas.microsoft.com/office/powerpoint/2010/main" val="740771713"/>
       </p:ext>
     </p:extLst>
   </p:cSld>
@@ -1239,10 +1429,38 @@
           <a:bodyPr/>
           <a:lstStyle/>
           <a:p>
-            <a:r>
-              <a:rPr lang="fr-CH" dirty="0"/>
-              <a:t>Les tâches non-réalisées étaient optionnelles</a:t>
-            </a:r>
+            <a:pPr marL="0" indent="0">
+              <a:buNone/>
+            </a:pPr>
+            <a:r>
+              <a:rPr lang="fr-FR" dirty="0"/>
+              <a:t>Fait en fonction des issues, c'est </a:t>
+            </a:r>
+            <a:r>
+              <a:rPr lang="fr-FR" dirty="0" err="1"/>
+              <a:t>qu</a:t>
+            </a:r>
+            <a:r>
+              <a:rPr lang="fr-FR" dirty="0"/>
+              <a:t> une vue globale du projet, les </a:t>
+            </a:r>
+            <a:r>
+              <a:rPr lang="fr-FR" dirty="0" err="1"/>
+              <a:t>roles</a:t>
+            </a:r>
+            <a:r>
+              <a:rPr lang="fr-FR" dirty="0"/>
+              <a:t> ont </a:t>
+            </a:r>
+            <a:r>
+              <a:rPr lang="fr-FR" dirty="0" err="1"/>
+              <a:t>souven</a:t>
+            </a:r>
+            <a:r>
+              <a:rPr lang="fr-FR" dirty="0"/>
+              <a:t> changer en fonction des besoins et conséquences des diverses personne</a:t>
+            </a:r>
+            <a:endParaRPr lang="fr-CH" dirty="0"/>
           </a:p>
         </p:txBody>
       </p:sp>
@@ -1272,7 +1490,7 @@
     </p:spTree>
     <p:extLst>
       <p:ext uri="{BB962C8B-B14F-4D97-AF65-F5344CB8AC3E}">
-        <p14:creationId xmlns:p14="http://schemas.microsoft.com/office/powerpoint/2010/main" val="1621499871"/>
+        <p14:creationId xmlns:p14="http://schemas.microsoft.com/office/powerpoint/2010/main" val="628468887"/>
       </p:ext>
     </p:extLst>
   </p:cSld>
@@ -1328,81 +1546,7 @@
           <a:p>
             <a:r>
               <a:rPr lang="fr-CH" dirty="0"/>
-              <a:t>Nous avions des bases en </a:t>
-            </a:r>
-            <a:r>
-              <a:rPr lang="fr-CH" dirty="0" err="1"/>
-              <a:t>c#</a:t>
-            </a:r>
-            <a:r>
-              <a:rPr lang="fr-CH" dirty="0"/>
-              <a:t> et voulions les approfondir afin de nous familiariser avec un nouveau langage. L’utilisation </a:t>
-            </a:r>
-            <a:r>
-              <a:rPr lang="fr-CH" dirty="0" err="1"/>
-              <a:t>d’asp</a:t>
-            </a:r>
-            <a:r>
-              <a:rPr lang="fr-CH" dirty="0"/>
-              <a:t> est logique étant donné que c’est le </a:t>
-            </a:r>
-            <a:r>
-              <a:rPr lang="fr-CH" dirty="0" err="1"/>
-              <a:t>framework</a:t>
-            </a:r>
-            <a:r>
-              <a:rPr lang="fr-CH" dirty="0"/>
-              <a:t> utilisé pour </a:t>
-            </a:r>
-            <a:r>
-              <a:rPr lang="fr-CH" dirty="0" err="1"/>
-              <a:t>microsoft</a:t>
-            </a:r>
-            <a:r>
-              <a:rPr lang="fr-CH" dirty="0"/>
-              <a:t> afin de générer des pages </a:t>
-            </a:r>
-            <a:r>
-              <a:rPr lang="fr-CH" dirty="0" err="1"/>
-              <a:t>webs</a:t>
-            </a:r>
-            <a:r>
-              <a:rPr lang="fr-CH" dirty="0"/>
-              <a:t> à la demande</a:t>
-            </a:r>
-          </a:p>
-          <a:p>
-            <a:endParaRPr lang="fr-CH" dirty="0"/>
-          </a:p>
-          <a:p>
-            <a:r>
-              <a:rPr lang="fr-CH" dirty="0"/>
-              <a:t>Nous ne voulions ni faire de javascript / java et que en </a:t>
-            </a:r>
-            <a:r>
-              <a:rPr lang="fr-CH" dirty="0" err="1"/>
-              <a:t>c#</a:t>
-            </a:r>
-            <a:r>
-              <a:rPr lang="fr-CH" dirty="0"/>
-              <a:t> / </a:t>
-            </a:r>
-            <a:r>
-              <a:rPr lang="fr-CH" dirty="0" err="1"/>
-              <a:t>asp</a:t>
-            </a:r>
-            <a:r>
-              <a:rPr lang="fr-CH" dirty="0"/>
-              <a:t> ce sont des moyens de faire connus et largement documentés. Nous nous sommes donc décidés à utiliser ceci.</a:t>
-            </a:r>
-          </a:p>
-          <a:p>
-            <a:endParaRPr lang="fr-CH" dirty="0"/>
-          </a:p>
-          <a:p>
-            <a:r>
-              <a:rPr lang="fr-CH" dirty="0"/>
-              <a:t>On a juger non prioritaire d’accélérer et trop chronophage le déploiement de l’application.  Etant donné qu’une des solutions était difficile à faire et l’autre ne rapportait pas de gain de temps notable</a:t>
+              <a:t>Les tâches non-réalisées étaient optionnelles</a:t>
             </a:r>
           </a:p>
         </p:txBody>
@@ -1433,7 +1577,7 @@
     </p:spTree>
     <p:extLst>
       <p:ext uri="{BB962C8B-B14F-4D97-AF65-F5344CB8AC3E}">
-        <p14:creationId xmlns:p14="http://schemas.microsoft.com/office/powerpoint/2010/main" val="2976642993"/>
+        <p14:creationId xmlns:p14="http://schemas.microsoft.com/office/powerpoint/2010/main" val="1621499871"/>
       </p:ext>
     </p:extLst>
   </p:cSld>
@@ -1489,23 +1633,47 @@
           <a:p>
             <a:r>
               <a:rPr lang="fr-CH" dirty="0"/>
-              <a:t>Pour utiliser </a:t>
+              <a:t>Nous avions des bases en </a:t>
             </a:r>
             <a:r>
               <a:rPr lang="fr-CH" dirty="0" err="1"/>
-              <a:t>signalR</a:t>
+              <a:t>c#</a:t>
             </a:r>
             <a:r>
               <a:rPr lang="fr-CH" dirty="0"/>
-              <a:t> et </a:t>
+              <a:t> et voulions les approfondir afin de nous familiariser avec un nouveau langage. L’utilisation </a:t>
             </a:r>
             <a:r>
               <a:rPr lang="fr-CH" dirty="0" err="1"/>
-              <a:t>blazor</a:t>
+              <a:t>d’asp</a:t>
             </a:r>
             <a:r>
               <a:rPr lang="fr-CH" dirty="0"/>
-              <a:t>, il est nécessaire que tout le site ne soit que sur une seule page, ce que nous avions pas compris de base. Une fois que nous avons changer pour ça le projet a avancer beaucoup plus vite</a:t>
+              <a:t> est logique étant donné que c’est le </a:t>
+            </a:r>
+            <a:r>
+              <a:rPr lang="fr-CH" dirty="0" err="1"/>
+              <a:t>framework</a:t>
+            </a:r>
+            <a:r>
+              <a:rPr lang="fr-CH" dirty="0"/>
+              <a:t> utilisé pour </a:t>
+            </a:r>
+            <a:r>
+              <a:rPr lang="fr-CH" dirty="0" err="1"/>
+              <a:t>microsoft</a:t>
+            </a:r>
+            <a:r>
+              <a:rPr lang="fr-CH" dirty="0"/>
+              <a:t> afin de générer des pages </a:t>
+            </a:r>
+            <a:r>
+              <a:rPr lang="fr-CH" dirty="0" err="1"/>
+              <a:t>webs</a:t>
+            </a:r>
+            <a:r>
+              <a:rPr lang="fr-CH" dirty="0"/>
+              <a:t> à la demande</a:t>
             </a:r>
           </a:p>
           <a:p>
@@ -1514,7 +1682,23 @@
           <a:p>
             <a:r>
               <a:rPr lang="fr-CH" dirty="0"/>
-              <a:t>Au commencement, le but de l’application était qu’elle marche sans interface web. Le code ayant été produit par la suite c’est donc retrouvé pas du tout adapté pour faire des interactions clients serveurs. Il a donc fallu revoir tout le code, afin de le rendre plus adapté à nos besoins. La refonte a certes prit du temps, mais une fois terminée l’avancement du projet à été beaucoup plus rapide et surtout beaucoup plus compréhensible par un tiers.</a:t>
+              <a:t>Nous ne voulions ni faire de javascript / java et que en </a:t>
+            </a:r>
+            <a:r>
+              <a:rPr lang="fr-CH" dirty="0" err="1"/>
+              <a:t>c#</a:t>
+            </a:r>
+            <a:r>
+              <a:rPr lang="fr-CH" dirty="0"/>
+              <a:t> / </a:t>
+            </a:r>
+            <a:r>
+              <a:rPr lang="fr-CH" dirty="0" err="1"/>
+              <a:t>asp</a:t>
+            </a:r>
+            <a:r>
+              <a:rPr lang="fr-CH" dirty="0"/>
+              <a:t> ce sont des moyens de faire connus et largement documentés. Nous nous sommes donc décidés à utiliser ceci.</a:t>
             </a:r>
           </a:p>
           <a:p>
@@ -1523,57 +1707,7 @@
           <a:p>
             <a:r>
               <a:rPr lang="fr-CH" dirty="0"/>
-              <a:t>Le projet crée à la base était basé sur un projet de test disponible en ligne. Nous voulions prendre ledit projet et le modifier pour qu’il gère notre jeu de cartes. Cela c’est avéré une perte de temps importante étant donné qu’il était impossible de le faire correspondre à ce qu’on voulait. Nous avons donc recréer un projet depuis le début et séparer le tout en client / server / </a:t>
-            </a:r>
-            <a:r>
-              <a:rPr lang="fr-CH" dirty="0" err="1"/>
-              <a:t>shared</a:t>
-            </a:r>
-            <a:r>
-              <a:rPr lang="fr-CH" dirty="0"/>
-              <a:t>.</a:t>
-            </a:r>
-          </a:p>
-          <a:p>
-            <a:endParaRPr lang="fr-CH" dirty="0"/>
-          </a:p>
-          <a:p>
-            <a:r>
-              <a:rPr lang="fr-CH" dirty="0"/>
-              <a:t>On voulait </a:t>
-            </a:r>
-            <a:r>
-              <a:rPr lang="fr-CH" dirty="0" err="1"/>
-              <a:t>deploy</a:t>
-            </a:r>
-            <a:r>
-              <a:rPr lang="fr-CH" dirty="0"/>
-              <a:t> uniquement lorsque l’on merge une </a:t>
-            </a:r>
-            <a:r>
-              <a:rPr lang="fr-CH" dirty="0" err="1"/>
-              <a:t>branch</a:t>
-            </a:r>
-            <a:r>
-              <a:rPr lang="fr-CH" dirty="0"/>
-              <a:t> sur le main avec un tag spécifique. Ce qui c’est avéré impossible. Notre solution alternative a donc été de déployé que lorsque l’on push un tag sur main.</a:t>
-            </a:r>
-          </a:p>
-          <a:p>
-            <a:endParaRPr lang="fr-CH" dirty="0"/>
-          </a:p>
-          <a:p>
-            <a:r>
-              <a:rPr lang="fr-CH" dirty="0"/>
-              <a:t>Nous voulions prendre des images custom, mais ceci n’</a:t>
-            </a:r>
-            <a:r>
-              <a:rPr lang="fr-CH" dirty="0" err="1"/>
-              <a:t>etant</a:t>
-            </a:r>
-            <a:r>
-              <a:rPr lang="fr-CH" dirty="0"/>
-              <a:t> pas la chose la plus prioritaire, nous avons pour l’instant scanner et utiliser les images du jeu de base, malgré le fait que celles-ci sont très probablement pas libre de droit</a:t>
+              <a:t>On a juger non prioritaire d’accélérer et trop chronophage le déploiement de l’application.  Etant donné qu’une des solutions était difficile à faire et l’autre ne rapportait pas de gain de temps notable</a:t>
             </a:r>
           </a:p>
         </p:txBody>
@@ -1604,7 +1738,7 @@
     </p:spTree>
     <p:extLst>
       <p:ext uri="{BB962C8B-B14F-4D97-AF65-F5344CB8AC3E}">
-        <p14:creationId xmlns:p14="http://schemas.microsoft.com/office/powerpoint/2010/main" val="3575162479"/>
+        <p14:creationId xmlns:p14="http://schemas.microsoft.com/office/powerpoint/2010/main" val="2976642993"/>
       </p:ext>
     </p:extLst>
   </p:cSld>
@@ -1660,7 +1794,91 @@
           <a:p>
             <a:r>
               <a:rPr lang="fr-CH" dirty="0"/>
-              <a:t>Nous sommes satisfait du travail fourni. Le départ était relativement lent, mais une fois que l’architecture était mise en place, le travail à été grandement accélérer. </a:t>
+              <a:t>Pour utiliser </a:t>
+            </a:r>
+            <a:r>
+              <a:rPr lang="fr-CH" dirty="0" err="1"/>
+              <a:t>signalR</a:t>
+            </a:r>
+            <a:r>
+              <a:rPr lang="fr-CH" dirty="0"/>
+              <a:t> et </a:t>
+            </a:r>
+            <a:r>
+              <a:rPr lang="fr-CH" dirty="0" err="1"/>
+              <a:t>blazor</a:t>
+            </a:r>
+            <a:r>
+              <a:rPr lang="fr-CH" dirty="0"/>
+              <a:t>, il est nécessaire que tout le site ne soit que sur une seule page, ce que nous avions pas compris de base. Une fois que nous avons changer pour ça le projet a avancer beaucoup plus vite</a:t>
+            </a:r>
+          </a:p>
+          <a:p>
+            <a:endParaRPr lang="fr-CH" dirty="0"/>
+          </a:p>
+          <a:p>
+            <a:r>
+              <a:rPr lang="fr-CH" dirty="0"/>
+              <a:t>Au commencement, le but de l’application était qu’elle marche sans interface web. Le code ayant été produit par la suite c’est donc retrouvé pas du tout adapté pour faire des interactions clients serveurs. Il a donc fallu revoir tout le code, afin de le rendre plus adapté à nos besoins. La refonte a certes prit du temps, mais une fois terminée l’avancement du projet à été beaucoup plus rapide et surtout beaucoup plus compréhensible par un tiers.</a:t>
+            </a:r>
+          </a:p>
+          <a:p>
+            <a:endParaRPr lang="fr-CH" dirty="0"/>
+          </a:p>
+          <a:p>
+            <a:r>
+              <a:rPr lang="fr-CH" dirty="0"/>
+              <a:t>Le projet crée à la base était basé sur un projet de test disponible en ligne. Nous voulions prendre ledit projet et le modifier pour qu’il gère notre jeu de cartes. Cela c’est avéré une perte de temps importante étant donné qu’il était impossible de le faire correspondre à ce qu’on voulait. Nous avons donc recréer un projet depuis le début et séparer le tout en client / server / </a:t>
+            </a:r>
+            <a:r>
+              <a:rPr lang="fr-CH" dirty="0" err="1"/>
+              <a:t>shared</a:t>
+            </a:r>
+            <a:r>
+              <a:rPr lang="fr-CH" dirty="0"/>
+              <a:t>.</a:t>
+            </a:r>
+          </a:p>
+          <a:p>
+            <a:endParaRPr lang="fr-CH" dirty="0"/>
+          </a:p>
+          <a:p>
+            <a:r>
+              <a:rPr lang="fr-CH" dirty="0"/>
+              <a:t>On voulait </a:t>
+            </a:r>
+            <a:r>
+              <a:rPr lang="fr-CH" dirty="0" err="1"/>
+              <a:t>deploy</a:t>
+            </a:r>
+            <a:r>
+              <a:rPr lang="fr-CH" dirty="0"/>
+              <a:t> uniquement lorsque l’on merge une </a:t>
+            </a:r>
+            <a:r>
+              <a:rPr lang="fr-CH" dirty="0" err="1"/>
+              <a:t>branch</a:t>
+            </a:r>
+            <a:r>
+              <a:rPr lang="fr-CH" dirty="0"/>
+              <a:t> sur le main avec un tag spécifique. Ce qui c’est avéré impossible. Notre solution alternative a donc été de déployé que lorsque l’on push un tag sur main.</a:t>
+            </a:r>
+          </a:p>
+          <a:p>
+            <a:endParaRPr lang="fr-CH" dirty="0"/>
+          </a:p>
+          <a:p>
+            <a:r>
+              <a:rPr lang="fr-CH" dirty="0"/>
+              <a:t>Nous voulions prendre des images custom, mais ceci n’</a:t>
+            </a:r>
+            <a:r>
+              <a:rPr lang="fr-CH" dirty="0" err="1"/>
+              <a:t>etant</a:t>
+            </a:r>
+            <a:r>
+              <a:rPr lang="fr-CH" dirty="0"/>
+              <a:t> pas la chose la plus prioritaire, nous avons pour l’instant scanner et utiliser les images du jeu de base, malgré le fait que celles-ci sont très probablement pas libre de droit</a:t>
             </a:r>
           </a:p>
         </p:txBody>
@@ -1683,6 +1901,93 @@
             <a:fld id="{5E0A905D-A60E-43A0-853E-C1E62C61160C}" type="slidenum">
               <a:rPr lang="fr-CH" smtClean="0"/>
               <a:t>11</a:t>
+            </a:fld>
+            <a:endParaRPr lang="fr-CH"/>
+          </a:p>
+        </p:txBody>
+      </p:sp>
+    </p:spTree>
+    <p:extLst>
+      <p:ext uri="{BB962C8B-B14F-4D97-AF65-F5344CB8AC3E}">
+        <p14:creationId xmlns:p14="http://schemas.microsoft.com/office/powerpoint/2010/main" val="3575162479"/>
+      </p:ext>
+    </p:extLst>
+  </p:cSld>
+  <p:clrMapOvr>
+    <a:masterClrMapping/>
+  </p:clrMapOvr>
+</p:notes>
+</file>
+
+<file path=ppt/notesSlides/notesSlide7.xml><?xml version="1.0" encoding="utf-8"?>
+<p:notes xmlns:a="http://schemas.openxmlformats.org/drawingml/2006/main" xmlns:r="http://schemas.openxmlformats.org/officeDocument/2006/relationships" xmlns:p="http://schemas.openxmlformats.org/presentationml/2006/main">
+  <p:cSld>
+    <p:spTree>
+      <p:nvGrpSpPr>
+        <p:cNvPr id="1" name=""/>
+        <p:cNvGrpSpPr/>
+        <p:nvPr/>
+      </p:nvGrpSpPr>
+      <p:grpSpPr>
+        <a:xfrm>
+          <a:off x="0" y="0"/>
+          <a:ext cx="0" cy="0"/>
+          <a:chOff x="0" y="0"/>
+          <a:chExt cx="0" cy="0"/>
+        </a:xfrm>
+      </p:grpSpPr>
+      <p:sp>
+        <p:nvSpPr>
+          <p:cNvPr id="2" name="Espace réservé de l'image des diapositives 1"/>
+          <p:cNvSpPr>
+            <a:spLocks noGrp="1" noRot="1" noChangeAspect="1"/>
+          </p:cNvSpPr>
+          <p:nvPr>
+            <p:ph type="sldImg"/>
+          </p:nvPr>
+        </p:nvSpPr>
+        <p:spPr/>
+      </p:sp>
+      <p:sp>
+        <p:nvSpPr>
+          <p:cNvPr id="3" name="Espace réservé des notes 2"/>
+          <p:cNvSpPr>
+            <a:spLocks noGrp="1"/>
+          </p:cNvSpPr>
+          <p:nvPr>
+            <p:ph type="body" idx="1"/>
+          </p:nvPr>
+        </p:nvSpPr>
+        <p:spPr/>
+        <p:txBody>
+          <a:bodyPr/>
+          <a:lstStyle/>
+          <a:p>
+            <a:r>
+              <a:rPr lang="fr-CH" dirty="0"/>
+              <a:t>Nous sommes satisfait du travail fourni. Le départ était relativement lent, mais une fois que l’architecture était mise en place, le travail à été grandement accélérer. </a:t>
+            </a:r>
+          </a:p>
+        </p:txBody>
+      </p:sp>
+      <p:sp>
+        <p:nvSpPr>
+          <p:cNvPr id="4" name="Espace réservé du numéro de diapositive 3"/>
+          <p:cNvSpPr>
+            <a:spLocks noGrp="1"/>
+          </p:cNvSpPr>
+          <p:nvPr>
+            <p:ph type="sldNum" sz="quarter" idx="5"/>
+          </p:nvPr>
+        </p:nvSpPr>
+        <p:spPr/>
+        <p:txBody>
+          <a:bodyPr/>
+          <a:lstStyle/>
+          <a:p>
+            <a:fld id="{5E0A905D-A60E-43A0-853E-C1E62C61160C}" type="slidenum">
+              <a:rPr lang="fr-CH" smtClean="0"/>
+              <a:t>12</a:t>
             </a:fld>
             <a:endParaRPr lang="fr-CH"/>
           </a:p>
@@ -6862,35 +7167,35 @@
           <a:p>
             <a:pPr lvl="0"/>
             <a:r>
-              <a:rPr lang="fr-FR"/>
+              <a:rPr lang="fr-FR" dirty="0"/>
               <a:t>Cliquez pour modifier les styles du texte du masque</a:t>
             </a:r>
           </a:p>
           <a:p>
             <a:pPr lvl="1"/>
             <a:r>
-              <a:rPr lang="fr-FR"/>
+              <a:rPr lang="fr-FR" dirty="0"/>
               <a:t>Deuxième niveau</a:t>
             </a:r>
           </a:p>
           <a:p>
             <a:pPr lvl="2"/>
             <a:r>
-              <a:rPr lang="fr-FR"/>
+              <a:rPr lang="fr-FR" dirty="0"/>
               <a:t>Troisième niveau</a:t>
             </a:r>
           </a:p>
           <a:p>
             <a:pPr lvl="3"/>
             <a:r>
-              <a:rPr lang="fr-FR"/>
+              <a:rPr lang="fr-FR" dirty="0"/>
               <a:t>Quatrième niveau</a:t>
             </a:r>
           </a:p>
           <a:p>
             <a:pPr lvl="4"/>
             <a:r>
-              <a:rPr lang="fr-FR"/>
+              <a:rPr lang="fr-FR" dirty="0"/>
               <a:t>Cinquième niveau</a:t>
             </a:r>
             <a:endParaRPr lang="en-US" dirty="0"/>
@@ -7127,7 +7432,7 @@
         <a:buSzPct val="80000"/>
         <a:buFont typeface="Wingdings 3" charset="2"/>
         <a:buChar char=""/>
-        <a:defRPr sz="1800" kern="1200">
+        <a:defRPr sz="2400" kern="1200">
           <a:solidFill>
             <a:schemeClr val="tx1">
               <a:lumMod val="75000"/>
@@ -7521,9 +7826,17 @@
           <a:bodyPr/>
           <a:lstStyle/>
           <a:p>
+            <a:pPr algn="l"/>
             <a:r>
               <a:rPr lang="fr-CH" dirty="0"/>
-              <a:t>Auteurs : Loïc Rosset, Alexandre Jaquier, Loris Marzullo, Géraud Silvestri, Stéphane Marengo</a:t>
+              <a:t>Auteurs : Loïc Rosset, Alexandre Jaquier,</a:t>
+            </a:r>
+          </a:p>
+          <a:p>
+            <a:pPr algn="l"/>
+            <a:r>
+              <a:rPr lang="fr-CH" dirty="0"/>
+              <a:t>Loris Marzullo, Géraud Silvestri, Stéphane Marengo</a:t>
             </a:r>
           </a:p>
         </p:txBody>
@@ -7563,6 +7876,164 @@
           <p:cNvPr id="2" name="Titre 1">
             <a:extLst>
               <a:ext uri="{FF2B5EF4-FFF2-40B4-BE49-F238E27FC236}">
+                <a16:creationId xmlns:a16="http://schemas.microsoft.com/office/drawing/2014/main" id="{77865A61-6318-5F84-233F-F687166C0A41}"/>
+              </a:ext>
+            </a:extLst>
+          </p:cNvPr>
+          <p:cNvSpPr>
+            <a:spLocks noGrp="1"/>
+          </p:cNvSpPr>
+          <p:nvPr>
+            <p:ph type="title"/>
+          </p:nvPr>
+        </p:nvSpPr>
+        <p:spPr/>
+        <p:txBody>
+          <a:bodyPr/>
+          <a:lstStyle/>
+          <a:p>
+            <a:r>
+              <a:rPr lang="fr-CH" dirty="0"/>
+              <a:t>Choix</a:t>
+            </a:r>
+          </a:p>
+        </p:txBody>
+      </p:sp>
+      <p:sp>
+        <p:nvSpPr>
+          <p:cNvPr id="3" name="Espace réservé du contenu 2">
+            <a:extLst>
+              <a:ext uri="{FF2B5EF4-FFF2-40B4-BE49-F238E27FC236}">
+                <a16:creationId xmlns:a16="http://schemas.microsoft.com/office/drawing/2014/main" id="{457F60C1-4C5F-C83D-1A96-A67789FF5DAD}"/>
+              </a:ext>
+            </a:extLst>
+          </p:cNvPr>
+          <p:cNvSpPr>
+            <a:spLocks noGrp="1"/>
+          </p:cNvSpPr>
+          <p:nvPr>
+            <p:ph idx="1"/>
+          </p:nvPr>
+        </p:nvSpPr>
+        <p:spPr/>
+        <p:txBody>
+          <a:bodyPr>
+            <a:normAutofit/>
+          </a:bodyPr>
+          <a:lstStyle/>
+          <a:p>
+            <a:r>
+              <a:rPr lang="fr-CH" sz="2400" dirty="0"/>
+              <a:t>Application web</a:t>
+            </a:r>
+          </a:p>
+          <a:p>
+            <a:r>
+              <a:rPr lang="fr-CH" sz="2400" dirty="0"/>
+              <a:t>C# </a:t>
+            </a:r>
+            <a:r>
+              <a:rPr lang="fr-CH" sz="2400" dirty="0">
+                <a:latin typeface="Calibri" panose="020F0502020204030204" pitchFamily="34" charset="0"/>
+                <a:cs typeface="Calibri" panose="020F0502020204030204" pitchFamily="34" charset="0"/>
+              </a:rPr>
+              <a:t>&amp;</a:t>
+            </a:r>
+            <a:r>
+              <a:rPr lang="fr-CH" sz="2400" dirty="0"/>
+              <a:t> </a:t>
+            </a:r>
+            <a:r>
+              <a:rPr lang="fr-CH" sz="2400" dirty="0" err="1"/>
+              <a:t>ASP.Net</a:t>
+            </a:r>
+            <a:endParaRPr lang="fr-CH" sz="2400" dirty="0"/>
+          </a:p>
+          <a:p>
+            <a:r>
+              <a:rPr lang="fr-CH" sz="2400" dirty="0" err="1"/>
+              <a:t>SignalR</a:t>
+            </a:r>
+            <a:endParaRPr lang="fr-CH" sz="2400" dirty="0"/>
+          </a:p>
+          <a:p>
+            <a:r>
+              <a:rPr lang="fr-CH" sz="2400" dirty="0" err="1"/>
+              <a:t>Blazor</a:t>
+            </a:r>
+            <a:r>
+              <a:rPr lang="fr-CH" sz="2400" dirty="0"/>
+              <a:t> </a:t>
+            </a:r>
+            <a:r>
+              <a:rPr lang="fr-CH" sz="2400" dirty="0">
+                <a:latin typeface="Calibri" panose="020F0502020204030204" pitchFamily="34" charset="0"/>
+                <a:cs typeface="Calibri" panose="020F0502020204030204" pitchFamily="34" charset="0"/>
+              </a:rPr>
+              <a:t>&amp;</a:t>
+            </a:r>
+            <a:r>
+              <a:rPr lang="fr-CH" sz="2400" dirty="0"/>
+              <a:t> </a:t>
+            </a:r>
+            <a:r>
+              <a:rPr lang="fr-CH" sz="2400" dirty="0" err="1"/>
+              <a:t>MudBlazor</a:t>
+            </a:r>
+            <a:endParaRPr lang="fr-CH" sz="2400" dirty="0"/>
+          </a:p>
+          <a:p>
+            <a:r>
+              <a:rPr lang="fr-CH" sz="2400" dirty="0"/>
+              <a:t>Accélération du déploiement abandonné</a:t>
+            </a:r>
+          </a:p>
+          <a:p>
+            <a:r>
+              <a:rPr lang="fr-CH" sz="2400" dirty="0"/>
+              <a:t>Fonctionnel vs Propreté</a:t>
+            </a:r>
+          </a:p>
+          <a:p>
+            <a:endParaRPr lang="fr-CH" dirty="0"/>
+          </a:p>
+        </p:txBody>
+      </p:sp>
+    </p:spTree>
+    <p:extLst>
+      <p:ext uri="{BB962C8B-B14F-4D97-AF65-F5344CB8AC3E}">
+        <p14:creationId xmlns:p14="http://schemas.microsoft.com/office/powerpoint/2010/main" val="3286106243"/>
+      </p:ext>
+    </p:extLst>
+  </p:cSld>
+  <p:clrMapOvr>
+    <a:masterClrMapping/>
+  </p:clrMapOvr>
+</p:sld>
+</file>
+
+<file path=ppt/slides/slide11.xml><?xml version="1.0" encoding="utf-8"?>
+<p:sld xmlns:a="http://schemas.openxmlformats.org/drawingml/2006/main" xmlns:r="http://schemas.openxmlformats.org/officeDocument/2006/relationships" xmlns:p="http://schemas.openxmlformats.org/presentationml/2006/main">
+  <p:cSld>
+    <p:spTree>
+      <p:nvGrpSpPr>
+        <p:cNvPr id="1" name=""/>
+        <p:cNvGrpSpPr/>
+        <p:nvPr/>
+      </p:nvGrpSpPr>
+      <p:grpSpPr>
+        <a:xfrm>
+          <a:off x="0" y="0"/>
+          <a:ext cx="0" cy="0"/>
+          <a:chOff x="0" y="0"/>
+          <a:chExt cx="0" cy="0"/>
+        </a:xfrm>
+      </p:grpSpPr>
+      <p:sp>
+        <p:nvSpPr>
+          <p:cNvPr id="2" name="Titre 1">
+            <a:extLst>
+              <a:ext uri="{FF2B5EF4-FFF2-40B4-BE49-F238E27FC236}">
                 <a16:creationId xmlns:a16="http://schemas.microsoft.com/office/drawing/2014/main" id="{1B3FFF55-C435-6E5F-BA90-8C2F392979BA}"/>
               </a:ext>
             </a:extLst>
@@ -7615,7 +8086,7 @@
         </p:nvSpPr>
         <p:spPr>
           <a:xfrm>
-            <a:off x="5034987" y="2312988"/>
+            <a:off x="5272054" y="2311755"/>
             <a:ext cx="4125499" cy="3880773"/>
           </a:xfrm>
         </p:spPr>
@@ -7626,37 +8097,37 @@
           <a:lstStyle/>
           <a:p>
             <a:r>
-              <a:rPr lang="fr-CH" dirty="0"/>
+              <a:rPr lang="fr-CH" sz="2400" dirty="0"/>
               <a:t>Tout mettre sur une page</a:t>
             </a:r>
           </a:p>
           <a:p>
             <a:r>
-              <a:rPr lang="fr-CH" dirty="0"/>
+              <a:rPr lang="fr-CH" sz="2400" dirty="0"/>
               <a:t>Refonte de tout le code</a:t>
             </a:r>
           </a:p>
           <a:p>
             <a:r>
-              <a:rPr lang="fr-CH" dirty="0"/>
+              <a:rPr lang="fr-CH" sz="2400" dirty="0"/>
               <a:t>Push de tag obligatoire</a:t>
             </a:r>
           </a:p>
           <a:p>
             <a:r>
-              <a:rPr lang="fr-CH" dirty="0"/>
+              <a:rPr lang="fr-CH" sz="2400" dirty="0"/>
               <a:t>Reprise des images du jeu</a:t>
             </a:r>
           </a:p>
           <a:p>
             <a:r>
-              <a:rPr lang="fr-CH" dirty="0"/>
+              <a:rPr lang="fr-CH" sz="2400" dirty="0"/>
               <a:t>Aucune solution trouvée</a:t>
             </a:r>
           </a:p>
           <a:p>
             <a:r>
-              <a:rPr lang="fr-CH" dirty="0"/>
+              <a:rPr lang="fr-CH" sz="2400" dirty="0"/>
               <a:t>Bricolage en HTML / CSS</a:t>
             </a:r>
           </a:p>
@@ -7678,8 +8149,8 @@
         </p:nvSpPr>
         <p:spPr>
           <a:xfrm>
-            <a:off x="829734" y="2312989"/>
-            <a:ext cx="4205253" cy="3880773"/>
+            <a:off x="361245" y="2311754"/>
+            <a:ext cx="5136444" cy="3880773"/>
           </a:xfrm>
           <a:prstGeom prst="rect">
             <a:avLst/>
@@ -7918,44 +8389,44 @@
           </a:lstStyle>
           <a:p>
             <a:r>
-              <a:rPr lang="fr-CH" sz="2000" dirty="0"/>
+              <a:rPr lang="fr-CH" sz="2400" dirty="0"/>
               <a:t>Communication non persistante</a:t>
             </a:r>
           </a:p>
           <a:p>
             <a:r>
-              <a:rPr lang="fr-CH" sz="2000" dirty="0"/>
+              <a:rPr lang="fr-CH" sz="2400" dirty="0"/>
               <a:t>Architecture de l’application</a:t>
             </a:r>
           </a:p>
           <a:p>
             <a:r>
-              <a:rPr lang="fr-CH" sz="2000" dirty="0"/>
+              <a:rPr lang="fr-CH" sz="2400" dirty="0"/>
               <a:t>Problème de CI/CD</a:t>
             </a:r>
           </a:p>
           <a:p>
             <a:r>
-              <a:rPr lang="fr-CH" sz="2000" dirty="0"/>
+              <a:rPr lang="fr-CH" sz="2400" dirty="0"/>
               <a:t>Images du jeu</a:t>
             </a:r>
           </a:p>
           <a:p>
             <a:r>
-              <a:rPr lang="fr-CH" sz="2000" dirty="0"/>
+              <a:rPr lang="fr-CH" sz="2400" dirty="0"/>
               <a:t>Debugger</a:t>
             </a:r>
           </a:p>
           <a:p>
             <a:r>
-              <a:rPr lang="fr-CH" sz="2000" dirty="0"/>
+              <a:rPr lang="fr-CH" sz="2400" dirty="0"/>
               <a:t>Personnalisation de </a:t>
             </a:r>
             <a:r>
-              <a:rPr lang="fr-CH" sz="2000" dirty="0" err="1"/>
+              <a:rPr lang="fr-CH" sz="2400" dirty="0" err="1"/>
               <a:t>MudBlazor</a:t>
             </a:r>
-            <a:endParaRPr lang="fr-CH" sz="2000" dirty="0"/>
+            <a:endParaRPr lang="fr-CH" sz="2400" dirty="0"/>
           </a:p>
         </p:txBody>
       </p:sp>
@@ -7972,7 +8443,7 @@
 </p:sld>
 </file>
 
-<file path=ppt/slides/slide11.xml><?xml version="1.0" encoding="utf-8"?>
+<file path=ppt/slides/slide12.xml><?xml version="1.0" encoding="utf-8"?>
 <p:sld xmlns:a="http://schemas.openxmlformats.org/drawingml/2006/main" xmlns:r="http://schemas.openxmlformats.org/officeDocument/2006/relationships" xmlns:p="http://schemas.openxmlformats.org/presentationml/2006/main">
   <p:cSld>
     <p:spTree>
@@ -8035,35 +8506,37 @@
         </p:nvSpPr>
         <p:spPr/>
         <p:txBody>
-          <a:bodyPr/>
+          <a:bodyPr>
+            <a:normAutofit/>
+          </a:bodyPr>
           <a:lstStyle/>
           <a:p>
             <a:r>
-              <a:rPr lang="fr-CH" dirty="0"/>
+              <a:rPr lang="fr-CH" sz="2400" dirty="0"/>
               <a:t>Contents du résultat</a:t>
             </a:r>
           </a:p>
           <a:p>
             <a:r>
-              <a:rPr lang="fr-CH" dirty="0"/>
+              <a:rPr lang="fr-CH" sz="2400" dirty="0"/>
               <a:t>Jeu de base fonctionnel</a:t>
             </a:r>
           </a:p>
           <a:p>
             <a:r>
-              <a:rPr lang="fr-CH" dirty="0"/>
+              <a:rPr lang="fr-CH" sz="2400" dirty="0"/>
               <a:t>Fonctionnalités optionnelles déjà débutées</a:t>
             </a:r>
           </a:p>
           <a:p>
             <a:r>
-              <a:rPr lang="fr-CH" dirty="0"/>
+              <a:rPr lang="fr-CH" sz="2400" dirty="0"/>
               <a:t>Prise en main lente</a:t>
             </a:r>
           </a:p>
           <a:p>
             <a:r>
-              <a:rPr lang="fr-CH" dirty="0"/>
+              <a:rPr lang="fr-CH" sz="2400" dirty="0"/>
               <a:t>Technologies intéressantes à utiliser</a:t>
             </a:r>
           </a:p>
@@ -8085,7 +8558,7 @@
 </p:sld>
 </file>
 
-<file path=ppt/slides/slide12.xml><?xml version="1.0" encoding="utf-8"?>
+<file path=ppt/slides/slide13.xml><?xml version="1.0" encoding="utf-8"?>
 <p:sld xmlns:a="http://schemas.openxmlformats.org/drawingml/2006/main" xmlns:r="http://schemas.openxmlformats.org/officeDocument/2006/relationships" xmlns:p="http://schemas.openxmlformats.org/presentationml/2006/main">
   <p:cSld>
     <p:spTree>
@@ -8469,8 +8942,8 @@
           </a:prstGeom>
         </p:spPr>
       </p:pic>
-      <mc:AlternateContent xmlns:mc="http://schemas.openxmlformats.org/markup-compatibility/2006">
-        <mc:Choice xmlns:p14="http://schemas.microsoft.com/office/powerpoint/2010/main" Requires="p14">
+      <mc:AlternateContent xmlns:mc="http://schemas.openxmlformats.org/markup-compatibility/2006" xmlns:p14="http://schemas.microsoft.com/office/powerpoint/2010/main">
+        <mc:Choice Requires="p14">
           <p:contentPart p14:bwMode="auto" r:id="rId3">
             <p14:nvContentPartPr>
               <p14:cNvPr id="28" name="Encre 27">
@@ -8489,7 +8962,7 @@
             </p14:xfrm>
           </p:contentPart>
         </mc:Choice>
-        <mc:Fallback>
+        <mc:Fallback xmlns="">
           <p:pic>
             <p:nvPicPr>
               <p:cNvPr id="28" name="Encre 27">
@@ -8520,8 +8993,8 @@
           </p:pic>
         </mc:Fallback>
       </mc:AlternateContent>
-      <mc:AlternateContent xmlns:mc="http://schemas.openxmlformats.org/markup-compatibility/2006">
-        <mc:Choice xmlns:p14="http://schemas.microsoft.com/office/powerpoint/2010/main" Requires="p14">
+      <mc:AlternateContent xmlns:mc="http://schemas.openxmlformats.org/markup-compatibility/2006" xmlns:p14="http://schemas.microsoft.com/office/powerpoint/2010/main">
+        <mc:Choice Requires="p14">
           <p:contentPart p14:bwMode="auto" r:id="rId5">
             <p14:nvContentPartPr>
               <p14:cNvPr id="30" name="Encre 29">
@@ -8540,7 +9013,7 @@
             </p14:xfrm>
           </p:contentPart>
         </mc:Choice>
-        <mc:Fallback>
+        <mc:Fallback xmlns="">
           <p:pic>
             <p:nvPicPr>
               <p:cNvPr id="30" name="Encre 29">
@@ -8571,8 +9044,8 @@
           </p:pic>
         </mc:Fallback>
       </mc:AlternateContent>
-      <mc:AlternateContent xmlns:mc="http://schemas.openxmlformats.org/markup-compatibility/2006">
-        <mc:Choice xmlns:p14="http://schemas.microsoft.com/office/powerpoint/2010/main" Requires="p14">
+      <mc:AlternateContent xmlns:mc="http://schemas.openxmlformats.org/markup-compatibility/2006" xmlns:p14="http://schemas.microsoft.com/office/powerpoint/2010/main">
+        <mc:Choice Requires="p14">
           <p:contentPart p14:bwMode="auto" r:id="rId7">
             <p14:nvContentPartPr>
               <p14:cNvPr id="31" name="Encre 30">
@@ -8591,7 +9064,7 @@
             </p14:xfrm>
           </p:contentPart>
         </mc:Choice>
-        <mc:Fallback>
+        <mc:Fallback xmlns="">
           <p:pic>
             <p:nvPicPr>
               <p:cNvPr id="31" name="Encre 30">
@@ -8665,7 +9138,7 @@
 </p:sld>
 </file>
 
-<file path=ppt/slides/slide13.xml><?xml version="1.0" encoding="utf-8"?>
+<file path=ppt/slides/slide14.xml><?xml version="1.0" encoding="utf-8"?>
 <p:sld xmlns:a="http://schemas.openxmlformats.org/drawingml/2006/main" xmlns:r="http://schemas.openxmlformats.org/officeDocument/2006/relationships" xmlns:p="http://schemas.openxmlformats.org/presentationml/2006/main">
   <p:cSld>
     <p:spTree>
@@ -8789,74 +9262,82 @@
             <p:ph idx="1"/>
           </p:nvPr>
         </p:nvSpPr>
-        <p:spPr/>
-        <p:txBody>
-          <a:bodyPr/>
+        <p:spPr>
+          <a:xfrm>
+            <a:off x="677334" y="1930400"/>
+            <a:ext cx="8596668" cy="4110963"/>
+          </a:xfrm>
+        </p:spPr>
+        <p:txBody>
+          <a:bodyPr>
+            <a:normAutofit lnSpcReduction="10000"/>
+          </a:bodyPr>
           <a:lstStyle/>
           <a:p>
             <a:r>
-              <a:rPr lang="fr-CH" dirty="0"/>
+              <a:rPr lang="fr-CH" sz="2400" dirty="0"/>
               <a:t>Contexte</a:t>
             </a:r>
           </a:p>
           <a:p>
             <a:r>
-              <a:rPr lang="fr-CH" dirty="0"/>
+              <a:rPr lang="fr-CH" sz="2400" dirty="0"/>
               <a:t>Problématique</a:t>
             </a:r>
           </a:p>
           <a:p>
             <a:r>
-              <a:rPr lang="fr-CH" dirty="0"/>
+              <a:rPr lang="fr-CH" sz="2400" dirty="0"/>
               <a:t>Solution</a:t>
             </a:r>
           </a:p>
           <a:p>
             <a:r>
-              <a:rPr lang="fr-CH" dirty="0"/>
+              <a:rPr lang="fr-CH" sz="2400" dirty="0"/>
               <a:t>Infrastructure</a:t>
             </a:r>
           </a:p>
           <a:p>
             <a:r>
-              <a:rPr lang="fr-CH" dirty="0"/>
+              <a:rPr lang="fr-CH" sz="2400" dirty="0"/>
               <a:t>Répartition du travail</a:t>
             </a:r>
           </a:p>
           <a:p>
             <a:r>
-              <a:rPr lang="fr-CH" dirty="0"/>
+              <a:rPr lang="fr-CH" sz="2400" dirty="0"/>
               <a:t>Bilan</a:t>
             </a:r>
           </a:p>
           <a:p>
             <a:r>
-              <a:rPr lang="fr-CH" dirty="0"/>
+              <a:rPr lang="fr-CH" sz="2400" dirty="0"/>
               <a:t>Choix</a:t>
             </a:r>
           </a:p>
           <a:p>
             <a:r>
-              <a:rPr lang="fr-CH" dirty="0"/>
+              <a:rPr lang="fr-CH" sz="2400" dirty="0"/>
               <a:t>Problèmes </a:t>
             </a:r>
             <a:r>
-              <a:rPr lang="fr-CH" dirty="0">
+              <a:rPr lang="fr-CH" sz="2400" dirty="0">
                 <a:latin typeface="Calibri" panose="020F0502020204030204" pitchFamily="34" charset="0"/>
                 <a:cs typeface="Calibri" panose="020F0502020204030204" pitchFamily="34" charset="0"/>
               </a:rPr>
               <a:t>&amp;</a:t>
             </a:r>
             <a:r>
-              <a:rPr lang="fr-CH" dirty="0"/>
+              <a:rPr lang="fr-CH" sz="2400" dirty="0"/>
               <a:t> solutions</a:t>
             </a:r>
           </a:p>
           <a:p>
             <a:r>
-              <a:rPr lang="fr-CH" dirty="0"/>
+              <a:rPr lang="fr-CH" sz="2400" dirty="0"/>
               <a:t>Conclusion</a:t>
             </a:r>
+            <a:endParaRPr lang="fr-CH" sz="1400" dirty="0"/>
           </a:p>
         </p:txBody>
       </p:sp>
@@ -10071,23 +10552,25 @@
         </p:nvSpPr>
         <p:spPr/>
         <p:txBody>
-          <a:bodyPr/>
+          <a:bodyPr>
+            <a:normAutofit/>
+          </a:bodyPr>
           <a:lstStyle/>
           <a:p>
             <a:r>
-              <a:rPr lang="fr-CH" dirty="0"/>
+              <a:rPr lang="fr-CH" sz="2400" dirty="0"/>
               <a:t>Présence physique de tous les joueurs</a:t>
             </a:r>
           </a:p>
           <a:p>
             <a:r>
-              <a:rPr lang="fr-CH" dirty="0"/>
+              <a:rPr lang="fr-CH" sz="2400" dirty="0"/>
               <a:t>Boîte de jeu à disposition</a:t>
             </a:r>
           </a:p>
           <a:p>
             <a:r>
-              <a:rPr lang="fr-CH" dirty="0"/>
+              <a:rPr lang="fr-CH" sz="2400" dirty="0"/>
               <a:t>Calcul du score fastidieux</a:t>
             </a:r>
           </a:p>
@@ -10169,29 +10652,31 @@
         </p:nvSpPr>
         <p:spPr/>
         <p:txBody>
-          <a:bodyPr/>
+          <a:bodyPr>
+            <a:normAutofit/>
+          </a:bodyPr>
           <a:lstStyle/>
           <a:p>
             <a:r>
-              <a:rPr lang="fr-CH" dirty="0"/>
+              <a:rPr lang="fr-CH" sz="2400" dirty="0"/>
               <a:t>Portage Web du jeu physique</a:t>
             </a:r>
           </a:p>
           <a:p>
             <a:r>
-              <a:rPr lang="fr-CH" dirty="0"/>
+              <a:rPr lang="fr-CH" sz="2400" dirty="0"/>
               <a:t>Système de room pour grouper les joueurs</a:t>
             </a:r>
           </a:p>
           <a:p>
             <a:r>
-              <a:rPr lang="fr-CH" dirty="0"/>
+              <a:rPr lang="fr-CH" sz="2400" dirty="0"/>
               <a:t>Accès simplifié à la partie via un url</a:t>
             </a:r>
           </a:p>
           <a:p>
             <a:r>
-              <a:rPr lang="fr-CH" dirty="0"/>
+              <a:rPr lang="fr-CH" sz="2400" dirty="0"/>
               <a:t>Calcul des scores automatisé</a:t>
             </a:r>
           </a:p>
@@ -10355,7 +10840,7 @@
           <p:cNvPr id="2" name="Titre 1">
             <a:extLst>
               <a:ext uri="{FF2B5EF4-FFF2-40B4-BE49-F238E27FC236}">
-                <a16:creationId xmlns:a16="http://schemas.microsoft.com/office/drawing/2014/main" id="{05627D8C-6FB6-7752-D284-F621F20F8E41}"/>
+                <a16:creationId xmlns:a16="http://schemas.microsoft.com/office/drawing/2014/main" id="{2DC9FA5A-8BF8-8EE9-4564-0D72A3A3F521}"/>
               </a:ext>
             </a:extLst>
           </p:cNvPr>
@@ -10373,7 +10858,7 @@
           <a:p>
             <a:r>
               <a:rPr lang="fr-CH" dirty="0"/>
-              <a:t>Répartition du travail</a:t>
+              <a:t>Pipeline CI/CD</a:t>
             </a:r>
           </a:p>
         </p:txBody>
@@ -10383,7 +10868,7 @@
           <p:cNvPr id="3" name="Espace réservé du contenu 2">
             <a:extLst>
               <a:ext uri="{FF2B5EF4-FFF2-40B4-BE49-F238E27FC236}">
-                <a16:creationId xmlns:a16="http://schemas.microsoft.com/office/drawing/2014/main" id="{E4844BC5-F378-1863-0582-AAF5B38E320E}"/>
+                <a16:creationId xmlns:a16="http://schemas.microsoft.com/office/drawing/2014/main" id="{096D1CFF-E33C-5C09-23BA-F6FCC9A89EE9}"/>
               </a:ext>
             </a:extLst>
           </p:cNvPr>
@@ -10396,47 +10881,81 @@
         </p:nvSpPr>
         <p:spPr/>
         <p:txBody>
-          <a:bodyPr/>
+          <a:bodyPr>
+            <a:normAutofit/>
+          </a:bodyPr>
           <a:lstStyle/>
           <a:p>
             <a:r>
-              <a:rPr lang="fr-CH" dirty="0"/>
-              <a:t>Géraud : logique de jeu, communication, "animateur"</a:t>
-            </a:r>
-          </a:p>
-          <a:p>
-            <a:r>
-              <a:rPr lang="fr-CH" dirty="0"/>
-              <a:t>Stéphane : frontend, mise en place du serveur et du pipeline CI/CD, backend</a:t>
-            </a:r>
-          </a:p>
-          <a:p>
-            <a:r>
-              <a:rPr lang="fr-CH" dirty="0"/>
-              <a:t>Loris : documentation, frontend, tests unitaires, "graphiste"</a:t>
-            </a:r>
-          </a:p>
-          <a:p>
-            <a:r>
-              <a:rPr lang="fr-CH" dirty="0"/>
-              <a:t>Loïc : documentation, pipeline CI/CD, frontend, directeur "artistique"</a:t>
-            </a:r>
-          </a:p>
-          <a:p>
-            <a:r>
-              <a:rPr lang="fr-CH" dirty="0"/>
-              <a:t>Alexandre : logique de jeu, communication</a:t>
-            </a:r>
-          </a:p>
-          <a:p>
-            <a:endParaRPr lang="fr-CH" dirty="0"/>
+              <a:rPr lang="fr-CH" sz="2400" dirty="0"/>
+              <a:t>GitHub actions fournies par Azure</a:t>
+            </a:r>
+          </a:p>
+          <a:p>
+            <a:r>
+              <a:rPr lang="fr-CH" sz="2400" dirty="0"/>
+              <a:t>Conventions de nommage sur les branches</a:t>
+            </a:r>
+          </a:p>
+          <a:p>
+            <a:r>
+              <a:rPr lang="fr-CH" sz="2400" dirty="0"/>
+              <a:t>Protection de la branche main</a:t>
+            </a:r>
+          </a:p>
+          <a:p>
+            <a:r>
+              <a:rPr lang="fr-CH" sz="2400" dirty="0" err="1"/>
+              <a:t>Reviewer</a:t>
+            </a:r>
+            <a:r>
+              <a:rPr lang="fr-CH" sz="2400" dirty="0"/>
+              <a:t> sur les pull </a:t>
+            </a:r>
+            <a:r>
+              <a:rPr lang="fr-CH" sz="2400" dirty="0" err="1"/>
+              <a:t>requests</a:t>
+            </a:r>
+            <a:endParaRPr lang="fr-CH" sz="2400" dirty="0"/>
+          </a:p>
+          <a:p>
+            <a:r>
+              <a:rPr lang="fr-CH" sz="2400" dirty="0"/>
+              <a:t>Vérification des tests sur les pull </a:t>
+            </a:r>
+            <a:r>
+              <a:rPr lang="fr-CH" sz="2400" dirty="0" err="1"/>
+              <a:t>requests</a:t>
+            </a:r>
+            <a:endParaRPr lang="fr-CH" sz="2400" dirty="0"/>
+          </a:p>
+          <a:p>
+            <a:r>
+              <a:rPr lang="fr-CH" sz="2400" dirty="0"/>
+              <a:t>Formatage du code lors des </a:t>
+            </a:r>
+            <a:r>
+              <a:rPr lang="fr-CH" sz="2400" dirty="0" err="1"/>
+              <a:t>commits</a:t>
+            </a:r>
+            <a:endParaRPr lang="fr-CH" sz="2400" dirty="0"/>
+          </a:p>
+          <a:p>
+            <a:r>
+              <a:rPr lang="fr-CH" sz="2400" dirty="0" err="1"/>
+              <a:t>Deploiment</a:t>
+            </a:r>
+            <a:r>
+              <a:rPr lang="fr-CH" sz="2400" dirty="0"/>
+              <a:t> avec un tag</a:t>
+            </a:r>
           </a:p>
         </p:txBody>
       </p:sp>
     </p:spTree>
     <p:extLst>
       <p:ext uri="{BB962C8B-B14F-4D97-AF65-F5344CB8AC3E}">
-        <p14:creationId xmlns:p14="http://schemas.microsoft.com/office/powerpoint/2010/main" val="1393636168"/>
+        <p14:creationId xmlns:p14="http://schemas.microsoft.com/office/powerpoint/2010/main" val="1996608482"/>
       </p:ext>
     </p:extLst>
   </p:cSld>
@@ -10468,7 +10987,7 @@
           <p:cNvPr id="2" name="Titre 1">
             <a:extLst>
               <a:ext uri="{FF2B5EF4-FFF2-40B4-BE49-F238E27FC236}">
-                <a16:creationId xmlns:a16="http://schemas.microsoft.com/office/drawing/2014/main" id="{0E1EE95D-F906-D80E-167B-99B87DEC7C63}"/>
+                <a16:creationId xmlns:a16="http://schemas.microsoft.com/office/drawing/2014/main" id="{05627D8C-6FB6-7752-D284-F621F20F8E41}"/>
               </a:ext>
             </a:extLst>
           </p:cNvPr>
@@ -10486,17 +11005,17 @@
           <a:p>
             <a:r>
               <a:rPr lang="fr-CH" dirty="0"/>
-              <a:t>Bilan</a:t>
-            </a:r>
-          </a:p>
-        </p:txBody>
-      </p:sp>
-      <p:sp>
-        <p:nvSpPr>
-          <p:cNvPr id="3" name="Espace réservé du texte 2">
+              <a:t>Répartition du travail</a:t>
+            </a:r>
+          </a:p>
+        </p:txBody>
+      </p:sp>
+      <p:sp>
+        <p:nvSpPr>
+          <p:cNvPr id="3" name="Espace réservé du contenu 2">
             <a:extLst>
               <a:ext uri="{FF2B5EF4-FFF2-40B4-BE49-F238E27FC236}">
-                <a16:creationId xmlns:a16="http://schemas.microsoft.com/office/drawing/2014/main" id="{85373F33-A845-F99F-BB75-0430AFF5F0F2}"/>
+                <a16:creationId xmlns:a16="http://schemas.microsoft.com/office/drawing/2014/main" id="{E4844BC5-F378-1863-0582-AAF5B38E320E}"/>
               </a:ext>
             </a:extLst>
           </p:cNvPr>
@@ -10504,139 +11023,59 @@
             <a:spLocks noGrp="1"/>
           </p:cNvSpPr>
           <p:nvPr>
-            <p:ph type="body" idx="1"/>
-          </p:nvPr>
-        </p:nvSpPr>
-        <p:spPr/>
-        <p:txBody>
-          <a:bodyPr/>
+            <p:ph idx="1"/>
+          </p:nvPr>
+        </p:nvSpPr>
+        <p:spPr>
+          <a:xfrm>
+            <a:off x="677334" y="2160589"/>
+            <a:ext cx="9121422" cy="3880773"/>
+          </a:xfrm>
+        </p:spPr>
+        <p:txBody>
+          <a:bodyPr>
+            <a:normAutofit/>
+          </a:bodyPr>
           <a:lstStyle/>
           <a:p>
             <a:r>
-              <a:rPr lang="fr-CH" dirty="0"/>
-              <a:t>Implémenté</a:t>
-            </a:r>
-          </a:p>
-        </p:txBody>
-      </p:sp>
-      <p:sp>
-        <p:nvSpPr>
-          <p:cNvPr id="4" name="Espace réservé du contenu 3">
-            <a:extLst>
-              <a:ext uri="{FF2B5EF4-FFF2-40B4-BE49-F238E27FC236}">
-                <a16:creationId xmlns:a16="http://schemas.microsoft.com/office/drawing/2014/main" id="{C51AB851-B18A-3CFF-BA2E-C2207E2C4EFA}"/>
-              </a:ext>
-            </a:extLst>
-          </p:cNvPr>
-          <p:cNvSpPr>
-            <a:spLocks noGrp="1"/>
-          </p:cNvSpPr>
-          <p:nvPr>
-            <p:ph sz="half" idx="2"/>
-          </p:nvPr>
-        </p:nvSpPr>
-        <p:spPr/>
-        <p:txBody>
-          <a:bodyPr/>
-          <a:lstStyle/>
-          <a:p>
-            <a:r>
-              <a:rPr lang="fr-CH" dirty="0"/>
-              <a:t>Jeu accessible en ligne</a:t>
-            </a:r>
-          </a:p>
-          <a:p>
-            <a:r>
-              <a:rPr lang="fr-CH" dirty="0"/>
-              <a:t>Système de salles</a:t>
-            </a:r>
-          </a:p>
-          <a:p>
-            <a:r>
-              <a:rPr lang="fr-CH" dirty="0"/>
-              <a:t>Règles du jeu authentiques</a:t>
-            </a:r>
-          </a:p>
-          <a:p>
-            <a:r>
-              <a:rPr lang="fr-CH" dirty="0"/>
-              <a:t>Score calculé</a:t>
-            </a:r>
-          </a:p>
-        </p:txBody>
-      </p:sp>
-      <p:sp>
-        <p:nvSpPr>
-          <p:cNvPr id="5" name="Espace réservé du texte 4">
-            <a:extLst>
-              <a:ext uri="{FF2B5EF4-FFF2-40B4-BE49-F238E27FC236}">
-                <a16:creationId xmlns:a16="http://schemas.microsoft.com/office/drawing/2014/main" id="{0BC677F2-6587-994D-3D24-97F4568FECAF}"/>
-              </a:ext>
-            </a:extLst>
-          </p:cNvPr>
-          <p:cNvSpPr>
-            <a:spLocks noGrp="1"/>
-          </p:cNvSpPr>
-          <p:nvPr>
-            <p:ph type="body" sz="quarter" idx="3"/>
-          </p:nvPr>
-        </p:nvSpPr>
-        <p:spPr/>
-        <p:txBody>
-          <a:bodyPr/>
-          <a:lstStyle/>
-          <a:p>
-            <a:r>
-              <a:rPr lang="fr-CH" dirty="0"/>
-              <a:t>Pas implémenté</a:t>
-            </a:r>
-          </a:p>
-        </p:txBody>
-      </p:sp>
-      <p:sp>
-        <p:nvSpPr>
-          <p:cNvPr id="6" name="Espace réservé du contenu 5">
-            <a:extLst>
-              <a:ext uri="{FF2B5EF4-FFF2-40B4-BE49-F238E27FC236}">
-                <a16:creationId xmlns:a16="http://schemas.microsoft.com/office/drawing/2014/main" id="{11BE9607-1212-60E3-26F0-81FFB43EC7F5}"/>
-              </a:ext>
-            </a:extLst>
-          </p:cNvPr>
-          <p:cNvSpPr>
-            <a:spLocks noGrp="1"/>
-          </p:cNvSpPr>
-          <p:nvPr>
-            <p:ph sz="quarter" idx="4"/>
-          </p:nvPr>
-        </p:nvSpPr>
-        <p:spPr/>
-        <p:txBody>
-          <a:bodyPr/>
-          <a:lstStyle/>
-          <a:p>
-            <a:r>
-              <a:rPr lang="fr-CH" dirty="0"/>
-              <a:t>Animation pour poser une carte</a:t>
-            </a:r>
-          </a:p>
-          <a:p>
-            <a:r>
-              <a:rPr lang="fr-CH" dirty="0"/>
-              <a:t>Modification des règles</a:t>
-            </a:r>
-          </a:p>
-          <a:p>
-            <a:r>
-              <a:rPr lang="fr-CH" dirty="0"/>
-              <a:t>Parties à + de 6 joueurs</a:t>
-            </a:r>
+              <a:rPr lang="fr-CH" sz="2400" dirty="0"/>
+              <a:t>Géraud : logique de jeu, communication, "animateur"</a:t>
+            </a:r>
+          </a:p>
+          <a:p>
+            <a:r>
+              <a:rPr lang="fr-CH" sz="2400" dirty="0"/>
+              <a:t>Stéphane : frontend, mise en place du serveur et du pipeline CI/CD, backend</a:t>
+            </a:r>
+          </a:p>
+          <a:p>
+            <a:r>
+              <a:rPr lang="fr-CH" sz="2400" dirty="0"/>
+              <a:t>Loris : documentation, frontend, tests unitaires, "graphiste"</a:t>
+            </a:r>
+          </a:p>
+          <a:p>
+            <a:r>
+              <a:rPr lang="fr-CH" sz="2400" dirty="0"/>
+              <a:t>Loïc : documentation, pipeline CI/CD, frontend, directeur "artistique"</a:t>
+            </a:r>
+          </a:p>
+          <a:p>
+            <a:r>
+              <a:rPr lang="fr-CH" sz="2400" dirty="0"/>
+              <a:t>Alexandre : logique de jeu, communication</a:t>
+            </a:r>
+          </a:p>
+          <a:p>
+            <a:endParaRPr lang="fr-CH" dirty="0"/>
           </a:p>
         </p:txBody>
       </p:sp>
     </p:spTree>
     <p:extLst>
       <p:ext uri="{BB962C8B-B14F-4D97-AF65-F5344CB8AC3E}">
-        <p14:creationId xmlns:p14="http://schemas.microsoft.com/office/powerpoint/2010/main" val="3309051491"/>
+        <p14:creationId xmlns:p14="http://schemas.microsoft.com/office/powerpoint/2010/main" val="1393636168"/>
       </p:ext>
     </p:extLst>
   </p:cSld>
@@ -10668,7 +11107,7 @@
           <p:cNvPr id="2" name="Titre 1">
             <a:extLst>
               <a:ext uri="{FF2B5EF4-FFF2-40B4-BE49-F238E27FC236}">
-                <a16:creationId xmlns:a16="http://schemas.microsoft.com/office/drawing/2014/main" id="{77865A61-6318-5F84-233F-F687166C0A41}"/>
+                <a16:creationId xmlns:a16="http://schemas.microsoft.com/office/drawing/2014/main" id="{0E1EE95D-F906-D80E-167B-99B87DEC7C63}"/>
               </a:ext>
             </a:extLst>
           </p:cNvPr>
@@ -10686,17 +11125,17 @@
           <a:p>
             <a:r>
               <a:rPr lang="fr-CH" dirty="0"/>
-              <a:t>Choix</a:t>
-            </a:r>
-          </a:p>
-        </p:txBody>
-      </p:sp>
-      <p:sp>
-        <p:nvSpPr>
-          <p:cNvPr id="3" name="Espace réservé du contenu 2">
+              <a:t>Bilan</a:t>
+            </a:r>
+          </a:p>
+        </p:txBody>
+      </p:sp>
+      <p:sp>
+        <p:nvSpPr>
+          <p:cNvPr id="3" name="Espace réservé du texte 2">
             <a:extLst>
               <a:ext uri="{FF2B5EF4-FFF2-40B4-BE49-F238E27FC236}">
-                <a16:creationId xmlns:a16="http://schemas.microsoft.com/office/drawing/2014/main" id="{457F60C1-4C5F-C83D-1A96-A67789FF5DAD}"/>
+                <a16:creationId xmlns:a16="http://schemas.microsoft.com/office/drawing/2014/main" id="{85373F33-A845-F99F-BB75-0430AFF5F0F2}"/>
               </a:ext>
             </a:extLst>
           </p:cNvPr>
@@ -10704,7 +11143,7 @@
             <a:spLocks noGrp="1"/>
           </p:cNvSpPr>
           <p:nvPr>
-            <p:ph idx="1"/>
+            <p:ph type="body" idx="1"/>
           </p:nvPr>
         </p:nvSpPr>
         <p:spPr/>
@@ -10713,86 +11152,134 @@
           <a:lstStyle/>
           <a:p>
             <a:r>
-              <a:rPr lang="fr-CH" dirty="0"/>
-              <a:t>Application web</a:t>
-            </a:r>
-          </a:p>
-          <a:p>
-            <a:r>
-              <a:rPr lang="fr-CH" dirty="0"/>
-              <a:t>C# </a:t>
-            </a:r>
-            <a:r>
-              <a:rPr lang="fr-CH" dirty="0">
-                <a:latin typeface="Calibri" panose="020F0502020204030204" pitchFamily="34" charset="0"/>
-                <a:cs typeface="Calibri" panose="020F0502020204030204" pitchFamily="34" charset="0"/>
-              </a:rPr>
-              <a:t>&amp;</a:t>
-            </a:r>
-            <a:r>
-              <a:rPr lang="fr-CH" dirty="0"/>
-              <a:t> </a:t>
-            </a:r>
-            <a:r>
-              <a:rPr lang="fr-CH" dirty="0" err="1"/>
-              <a:t>ASP.Net</a:t>
-            </a:r>
-            <a:endParaRPr lang="fr-CH" dirty="0"/>
-          </a:p>
-          <a:p>
-            <a:r>
-              <a:rPr lang="fr-CH" dirty="0" err="1"/>
-              <a:t>SignalR</a:t>
-            </a:r>
-            <a:endParaRPr lang="fr-CH" dirty="0"/>
-          </a:p>
-          <a:p>
-            <a:r>
-              <a:rPr lang="fr-CH" dirty="0" err="1"/>
-              <a:t>Blazor</a:t>
-            </a:r>
-            <a:r>
-              <a:rPr lang="fr-CH" dirty="0"/>
-              <a:t> </a:t>
-            </a:r>
-            <a:r>
-              <a:rPr lang="fr-CH" dirty="0">
-                <a:latin typeface="Calibri" panose="020F0502020204030204" pitchFamily="34" charset="0"/>
-                <a:cs typeface="Calibri" panose="020F0502020204030204" pitchFamily="34" charset="0"/>
-              </a:rPr>
-              <a:t>&amp;</a:t>
-            </a:r>
-            <a:r>
-              <a:rPr lang="fr-CH" dirty="0"/>
-              <a:t> </a:t>
-            </a:r>
-            <a:r>
-              <a:rPr lang="fr-CH" dirty="0" err="1"/>
-              <a:t>MudBlazor</a:t>
-            </a:r>
-            <a:endParaRPr lang="fr-CH" dirty="0"/>
-          </a:p>
-          <a:p>
-            <a:r>
-              <a:rPr lang="fr-CH" dirty="0"/>
-              <a:t>Accélération du déploiement abandonné</a:t>
-            </a:r>
-          </a:p>
-          <a:p>
-            <a:r>
-              <a:rPr lang="fr-CH" dirty="0"/>
-              <a:t>Fonctionnel vs Propreté</a:t>
-            </a:r>
-          </a:p>
-          <a:p>
-            <a:endParaRPr lang="fr-CH" dirty="0"/>
+              <a:rPr lang="fr-CH" u="sng" dirty="0"/>
+              <a:t>Implémenté</a:t>
+            </a:r>
+          </a:p>
+        </p:txBody>
+      </p:sp>
+      <p:sp>
+        <p:nvSpPr>
+          <p:cNvPr id="4" name="Espace réservé du contenu 3">
+            <a:extLst>
+              <a:ext uri="{FF2B5EF4-FFF2-40B4-BE49-F238E27FC236}">
+                <a16:creationId xmlns:a16="http://schemas.microsoft.com/office/drawing/2014/main" id="{C51AB851-B18A-3CFF-BA2E-C2207E2C4EFA}"/>
+              </a:ext>
+            </a:extLst>
+          </p:cNvPr>
+          <p:cNvSpPr>
+            <a:spLocks noGrp="1"/>
+          </p:cNvSpPr>
+          <p:nvPr>
+            <p:ph sz="half" idx="2"/>
+          </p:nvPr>
+        </p:nvSpPr>
+        <p:spPr/>
+        <p:txBody>
+          <a:bodyPr>
+            <a:normAutofit/>
+          </a:bodyPr>
+          <a:lstStyle/>
+          <a:p>
+            <a:r>
+              <a:rPr lang="fr-CH" sz="2400" dirty="0"/>
+              <a:t>Jeu accessible en ligne</a:t>
+            </a:r>
+          </a:p>
+          <a:p>
+            <a:r>
+              <a:rPr lang="fr-CH" sz="2400" dirty="0"/>
+              <a:t>Système de salles</a:t>
+            </a:r>
+          </a:p>
+          <a:p>
+            <a:r>
+              <a:rPr lang="fr-CH" sz="2400" dirty="0"/>
+              <a:t>Règles du jeu authentiques</a:t>
+            </a:r>
+          </a:p>
+          <a:p>
+            <a:r>
+              <a:rPr lang="fr-CH" sz="2400" dirty="0"/>
+              <a:t>Score calculé</a:t>
+            </a:r>
+          </a:p>
+        </p:txBody>
+      </p:sp>
+      <p:sp>
+        <p:nvSpPr>
+          <p:cNvPr id="5" name="Espace réservé du texte 4">
+            <a:extLst>
+              <a:ext uri="{FF2B5EF4-FFF2-40B4-BE49-F238E27FC236}">
+                <a16:creationId xmlns:a16="http://schemas.microsoft.com/office/drawing/2014/main" id="{0BC677F2-6587-994D-3D24-97F4568FECAF}"/>
+              </a:ext>
+            </a:extLst>
+          </p:cNvPr>
+          <p:cNvSpPr>
+            <a:spLocks noGrp="1"/>
+          </p:cNvSpPr>
+          <p:nvPr>
+            <p:ph type="body" sz="quarter" idx="3"/>
+          </p:nvPr>
+        </p:nvSpPr>
+        <p:spPr/>
+        <p:txBody>
+          <a:bodyPr/>
+          <a:lstStyle/>
+          <a:p>
+            <a:r>
+              <a:rPr lang="fr-CH" u="sng" dirty="0"/>
+              <a:t>Pas implémenté</a:t>
+            </a:r>
+          </a:p>
+        </p:txBody>
+      </p:sp>
+      <p:sp>
+        <p:nvSpPr>
+          <p:cNvPr id="6" name="Espace réservé du contenu 5">
+            <a:extLst>
+              <a:ext uri="{FF2B5EF4-FFF2-40B4-BE49-F238E27FC236}">
+                <a16:creationId xmlns:a16="http://schemas.microsoft.com/office/drawing/2014/main" id="{11BE9607-1212-60E3-26F0-81FFB43EC7F5}"/>
+              </a:ext>
+            </a:extLst>
+          </p:cNvPr>
+          <p:cNvSpPr>
+            <a:spLocks noGrp="1"/>
+          </p:cNvSpPr>
+          <p:nvPr>
+            <p:ph sz="quarter" idx="4"/>
+          </p:nvPr>
+        </p:nvSpPr>
+        <p:spPr/>
+        <p:txBody>
+          <a:bodyPr>
+            <a:normAutofit/>
+          </a:bodyPr>
+          <a:lstStyle/>
+          <a:p>
+            <a:r>
+              <a:rPr lang="fr-CH" sz="2400" dirty="0"/>
+              <a:t>Animation pour poser une carte</a:t>
+            </a:r>
+          </a:p>
+          <a:p>
+            <a:r>
+              <a:rPr lang="fr-CH" sz="2400" dirty="0"/>
+              <a:t>Modification des règles</a:t>
+            </a:r>
+          </a:p>
+          <a:p>
+            <a:r>
+              <a:rPr lang="fr-CH" sz="2400" dirty="0"/>
+              <a:t>Parties à + de 6 joueurs</a:t>
+            </a:r>
           </a:p>
         </p:txBody>
       </p:sp>
     </p:spTree>
     <p:extLst>
       <p:ext uri="{BB962C8B-B14F-4D97-AF65-F5344CB8AC3E}">
-        <p14:creationId xmlns:p14="http://schemas.microsoft.com/office/powerpoint/2010/main" val="3286106243"/>
+        <p14:creationId xmlns:p14="http://schemas.microsoft.com/office/powerpoint/2010/main" val="3309051491"/>
       </p:ext>
     </p:extLst>
   </p:cSld>
@@ -11352,4 +11839,299 @@
     </a:ext>
   </a:extLst>
 </a:theme>
+</file>
+
+<file path=ppt/theme/theme3.xml><?xml version="1.0" encoding="utf-8"?>
+<a:theme xmlns:a="http://schemas.openxmlformats.org/drawingml/2006/main" name="Thème Office">
+  <a:themeElements>
+    <a:clrScheme name="Office">
+      <a:dk1>
+        <a:sysClr val="windowText" lastClr="000000"/>
+      </a:dk1>
+      <a:lt1>
+        <a:sysClr val="window" lastClr="FFFFFF"/>
+      </a:lt1>
+      <a:dk2>
+        <a:srgbClr val="44546A"/>
+      </a:dk2>
+      <a:lt2>
+        <a:srgbClr val="E7E6E6"/>
+      </a:lt2>
+      <a:accent1>
+        <a:srgbClr val="4472C4"/>
+      </a:accent1>
+      <a:accent2>
+        <a:srgbClr val="ED7D31"/>
+      </a:accent2>
+      <a:accent3>
+        <a:srgbClr val="A5A5A5"/>
+      </a:accent3>
+      <a:accent4>
+        <a:srgbClr val="FFC000"/>
+      </a:accent4>
+      <a:accent5>
+        <a:srgbClr val="5B9BD5"/>
+      </a:accent5>
+      <a:accent6>
+        <a:srgbClr val="70AD47"/>
+      </a:accent6>
+      <a:hlink>
+        <a:srgbClr val="0563C1"/>
+      </a:hlink>
+      <a:folHlink>
+        <a:srgbClr val="954F72"/>
+      </a:folHlink>
+    </a:clrScheme>
+    <a:fontScheme name="Office">
+      <a:majorFont>
+        <a:latin typeface="Calibri Light" panose="020F0302020204030204"/>
+        <a:ea typeface=""/>
+        <a:cs typeface=""/>
+        <a:font script="Jpan" typeface="游ゴシック Light"/>
+        <a:font script="Hang" typeface="맑은 고딕"/>
+        <a:font script="Hans" typeface="等线 Light"/>
+        <a:font script="Hant" typeface="新細明體"/>
+        <a:font script="Arab" typeface="Times New Roman"/>
+        <a:font script="Hebr" typeface="Times New Roman"/>
+        <a:font script="Thai" typeface="Angsana New"/>
+        <a:font script="Ethi" typeface="Nyala"/>
+        <a:font script="Beng" typeface="Vrinda"/>
+        <a:font script="Gujr" typeface="Shruti"/>
+        <a:font script="Khmr" typeface="MoolBoran"/>
+        <a:font script="Knda" typeface="Tunga"/>
+        <a:font script="Guru" typeface="Raavi"/>
+        <a:font script="Cans" typeface="Euphemia"/>
+        <a:font script="Cher" typeface="Plantagenet Cherokee"/>
+        <a:font script="Yiii" typeface="Microsoft Yi Baiti"/>
+        <a:font script="Tibt" typeface="Microsoft Himalaya"/>
+        <a:font script="Thaa" typeface="MV Boli"/>
+        <a:font script="Deva" typeface="Mangal"/>
+        <a:font script="Telu" typeface="Gautami"/>
+        <a:font script="Taml" typeface="Latha"/>
+        <a:font script="Syrc" typeface="Estrangelo Edessa"/>
+        <a:font script="Orya" typeface="Kalinga"/>
+        <a:font script="Mlym" typeface="Kartika"/>
+        <a:font script="Laoo" typeface="DokChampa"/>
+        <a:font script="Sinh" typeface="Iskoola Pota"/>
+        <a:font script="Mong" typeface="Mongolian Baiti"/>
+        <a:font script="Viet" typeface="Times New Roman"/>
+        <a:font script="Uigh" typeface="Microsoft Uighur"/>
+        <a:font script="Geor" typeface="Sylfaen"/>
+        <a:font script="Armn" typeface="Arial"/>
+        <a:font script="Bugi" typeface="Leelawadee UI"/>
+        <a:font script="Bopo" typeface="Microsoft JhengHei"/>
+        <a:font script="Java" typeface="Javanese Text"/>
+        <a:font script="Lisu" typeface="Segoe UI"/>
+        <a:font script="Mymr" typeface="Myanmar Text"/>
+        <a:font script="Nkoo" typeface="Ebrima"/>
+        <a:font script="Olck" typeface="Nirmala UI"/>
+        <a:font script="Osma" typeface="Ebrima"/>
+        <a:font script="Phag" typeface="Phagspa"/>
+        <a:font script="Syrn" typeface="Estrangelo Edessa"/>
+        <a:font script="Syrj" typeface="Estrangelo Edessa"/>
+        <a:font script="Syre" typeface="Estrangelo Edessa"/>
+        <a:font script="Sora" typeface="Nirmala UI"/>
+        <a:font script="Tale" typeface="Microsoft Tai Le"/>
+        <a:font script="Talu" typeface="Microsoft New Tai Lue"/>
+        <a:font script="Tfng" typeface="Ebrima"/>
+      </a:majorFont>
+      <a:minorFont>
+        <a:latin typeface="Calibri" panose="020F0502020204030204"/>
+        <a:ea typeface=""/>
+        <a:cs typeface=""/>
+        <a:font script="Jpan" typeface="游ゴシック"/>
+        <a:font script="Hang" typeface="맑은 고딕"/>
+        <a:font script="Hans" typeface="等线"/>
+        <a:font script="Hant" typeface="新細明體"/>
+        <a:font script="Arab" typeface="Arial"/>
+        <a:font script="Hebr" typeface="Arial"/>
+        <a:font script="Thai" typeface="Cordia New"/>
+        <a:font script="Ethi" typeface="Nyala"/>
+        <a:font script="Beng" typeface="Vrinda"/>
+        <a:font script="Gujr" typeface="Shruti"/>
+        <a:font script="Khmr" typeface="DaunPenh"/>
+        <a:font script="Knda" typeface="Tunga"/>
+        <a:font script="Guru" typeface="Raavi"/>
+        <a:font script="Cans" typeface="Euphemia"/>
+        <a:font script="Cher" typeface="Plantagenet Cherokee"/>
+        <a:font script="Yiii" typeface="Microsoft Yi Baiti"/>
+        <a:font script="Tibt" typeface="Microsoft Himalaya"/>
+        <a:font script="Thaa" typeface="MV Boli"/>
+        <a:font script="Deva" typeface="Mangal"/>
+        <a:font script="Telu" typeface="Gautami"/>
+        <a:font script="Taml" typeface="Latha"/>
+        <a:font script="Syrc" typeface="Estrangelo Edessa"/>
+        <a:font script="Orya" typeface="Kalinga"/>
+        <a:font script="Mlym" typeface="Kartika"/>
+        <a:font script="Laoo" typeface="DokChampa"/>
+        <a:font script="Sinh" typeface="Iskoola Pota"/>
+        <a:font script="Mong" typeface="Mongolian Baiti"/>
+        <a:font script="Viet" typeface="Arial"/>
+        <a:font script="Uigh" typeface="Microsoft Uighur"/>
+        <a:font script="Geor" typeface="Sylfaen"/>
+        <a:font script="Armn" typeface="Arial"/>
+        <a:font script="Bugi" typeface="Leelawadee UI"/>
+        <a:font script="Bopo" typeface="Microsoft JhengHei"/>
+        <a:font script="Java" typeface="Javanese Text"/>
+        <a:font script="Lisu" typeface="Segoe UI"/>
+        <a:font script="Mymr" typeface="Myanmar Text"/>
+        <a:font script="Nkoo" typeface="Ebrima"/>
+        <a:font script="Olck" typeface="Nirmala UI"/>
+        <a:font script="Osma" typeface="Ebrima"/>
+        <a:font script="Phag" typeface="Phagspa"/>
+        <a:font script="Syrn" typeface="Estrangelo Edessa"/>
+        <a:font script="Syrj" typeface="Estrangelo Edessa"/>
+        <a:font script="Syre" typeface="Estrangelo Edessa"/>
+        <a:font script="Sora" typeface="Nirmala UI"/>
+        <a:font script="Tale" typeface="Microsoft Tai Le"/>
+        <a:font script="Talu" typeface="Microsoft New Tai Lue"/>
+        <a:font script="Tfng" typeface="Ebrima"/>
+      </a:minorFont>
+    </a:fontScheme>
+    <a:fmtScheme name="Office">
+      <a:fillStyleLst>
+        <a:solidFill>
+          <a:schemeClr val="phClr"/>
+        </a:solidFill>
+        <a:gradFill rotWithShape="1">
+          <a:gsLst>
+            <a:gs pos="0">
+              <a:schemeClr val="phClr">
+                <a:lumMod val="110000"/>
+                <a:satMod val="105000"/>
+                <a:tint val="67000"/>
+              </a:schemeClr>
+            </a:gs>
+            <a:gs pos="50000">
+              <a:schemeClr val="phClr">
+                <a:lumMod val="105000"/>
+                <a:satMod val="103000"/>
+                <a:tint val="73000"/>
+              </a:schemeClr>
+            </a:gs>
+            <a:gs pos="100000">
+              <a:schemeClr val="phClr">
+                <a:lumMod val="105000"/>
+                <a:satMod val="109000"/>
+                <a:tint val="81000"/>
+              </a:schemeClr>
+            </a:gs>
+          </a:gsLst>
+          <a:lin ang="5400000" scaled="0"/>
+        </a:gradFill>
+        <a:gradFill rotWithShape="1">
+          <a:gsLst>
+            <a:gs pos="0">
+              <a:schemeClr val="phClr">
+                <a:satMod val="103000"/>
+                <a:lumMod val="102000"/>
+                <a:tint val="94000"/>
+              </a:schemeClr>
+            </a:gs>
+            <a:gs pos="50000">
+              <a:schemeClr val="phClr">
+                <a:satMod val="110000"/>
+                <a:lumMod val="100000"/>
+                <a:shade val="100000"/>
+              </a:schemeClr>
+            </a:gs>
+            <a:gs pos="100000">
+              <a:schemeClr val="phClr">
+                <a:lumMod val="99000"/>
+                <a:satMod val="120000"/>
+                <a:shade val="78000"/>
+              </a:schemeClr>
+            </a:gs>
+          </a:gsLst>
+          <a:lin ang="5400000" scaled="0"/>
+        </a:gradFill>
+      </a:fillStyleLst>
+      <a:lnStyleLst>
+        <a:ln w="6350" cap="flat" cmpd="sng" algn="ctr">
+          <a:solidFill>
+            <a:schemeClr val="phClr"/>
+          </a:solidFill>
+          <a:prstDash val="solid"/>
+          <a:miter lim="800000"/>
+        </a:ln>
+        <a:ln w="12700" cap="flat" cmpd="sng" algn="ctr">
+          <a:solidFill>
+            <a:schemeClr val="phClr"/>
+          </a:solidFill>
+          <a:prstDash val="solid"/>
+          <a:miter lim="800000"/>
+        </a:ln>
+        <a:ln w="19050" cap="flat" cmpd="sng" algn="ctr">
+          <a:solidFill>
+            <a:schemeClr val="phClr"/>
+          </a:solidFill>
+          <a:prstDash val="solid"/>
+          <a:miter lim="800000"/>
+        </a:ln>
+      </a:lnStyleLst>
+      <a:effectStyleLst>
+        <a:effectStyle>
+          <a:effectLst/>
+        </a:effectStyle>
+        <a:effectStyle>
+          <a:effectLst/>
+        </a:effectStyle>
+        <a:effectStyle>
+          <a:effectLst>
+            <a:outerShdw blurRad="57150" dist="19050" dir="5400000" algn="ctr" rotWithShape="0">
+              <a:srgbClr val="000000">
+                <a:alpha val="63000"/>
+              </a:srgbClr>
+            </a:outerShdw>
+          </a:effectLst>
+        </a:effectStyle>
+      </a:effectStyleLst>
+      <a:bgFillStyleLst>
+        <a:solidFill>
+          <a:schemeClr val="phClr"/>
+        </a:solidFill>
+        <a:solidFill>
+          <a:schemeClr val="phClr">
+            <a:tint val="95000"/>
+            <a:satMod val="170000"/>
+          </a:schemeClr>
+        </a:solidFill>
+        <a:gradFill rotWithShape="1">
+          <a:gsLst>
+            <a:gs pos="0">
+              <a:schemeClr val="phClr">
+                <a:tint val="93000"/>
+                <a:satMod val="150000"/>
+                <a:shade val="98000"/>
+                <a:lumMod val="102000"/>
+              </a:schemeClr>
+            </a:gs>
+            <a:gs pos="50000">
+              <a:schemeClr val="phClr">
+                <a:tint val="98000"/>
+                <a:satMod val="130000"/>
+                <a:shade val="90000"/>
+                <a:lumMod val="103000"/>
+              </a:schemeClr>
+            </a:gs>
+            <a:gs pos="100000">
+              <a:schemeClr val="phClr">
+                <a:shade val="63000"/>
+                <a:satMod val="120000"/>
+              </a:schemeClr>
+            </a:gs>
+          </a:gsLst>
+          <a:lin ang="5400000" scaled="0"/>
+        </a:gradFill>
+      </a:bgFillStyleLst>
+    </a:fmtScheme>
+  </a:themeElements>
+  <a:objectDefaults/>
+  <a:extraClrSchemeLst/>
+  <a:extLst>
+    <a:ext uri="{05A4C25C-085E-4340-85A3-A5531E510DB2}">
+      <thm15:themeFamily xmlns:thm15="http://schemas.microsoft.com/office/thememl/2012/main" name="Office Theme" id="{62F939B6-93AF-4DB8-9C6B-D6C7DFDC589F}" vid="{4A3C46E8-61CC-4603-A589-7422A47A8E4A}"/>
+    </a:ext>
+  </a:extLst>
+</a:theme>
 </file>
</xml_diff>